<commit_message>
Updated charts in slides
</commit_message>
<xml_diff>
--- a/Documents/Presentation/Charts in slides.pptx
+++ b/Documents/Presentation/Charts in slides.pptx
@@ -408,11 +408,11 @@
           <c:showBubbleSize val="0"/>
         </c:dLbls>
         <c:smooth val="0"/>
-        <c:axId val="580925376"/>
-        <c:axId val="580927008"/>
+        <c:axId val="-37843744"/>
+        <c:axId val="-37849728"/>
       </c:lineChart>
       <c:catAx>
-        <c:axId val="580925376"/>
+        <c:axId val="-37843744"/>
         <c:scaling>
           <c:orientation val="minMax"/>
         </c:scaling>
@@ -556,7 +556,7 @@
             <a:endParaRPr lang="en-US"/>
           </a:p>
         </c:txPr>
-        <c:crossAx val="580927008"/>
+        <c:crossAx val="-37849728"/>
         <c:crosses val="autoZero"/>
         <c:auto val="1"/>
         <c:lblAlgn val="ctr"/>
@@ -564,7 +564,7 @@
         <c:noMultiLvlLbl val="0"/>
       </c:catAx>
       <c:valAx>
-        <c:axId val="580927008"/>
+        <c:axId val="-37849728"/>
         <c:scaling>
           <c:orientation val="minMax"/>
           <c:min val="50"/>
@@ -680,7 +680,7 @@
             <a:endParaRPr lang="en-US"/>
           </a:p>
         </c:txPr>
-        <c:crossAx val="580925376"/>
+        <c:crossAx val="-37843744"/>
         <c:crosses val="autoZero"/>
         <c:crossBetween val="midCat"/>
       </c:valAx>
@@ -828,6 +828,7 @@
           </a:p>
         </c:rich>
       </c:tx>
+      <c:layout/>
       <c:overlay val="0"/>
       <c:spPr>
         <a:noFill/>
@@ -1142,11 +1143,11 @@
         </c:dLbls>
         <c:gapWidth val="135"/>
         <c:overlap val="-30"/>
-        <c:axId val="901235680"/>
-        <c:axId val="901230240"/>
+        <c:axId val="-1863889344"/>
+        <c:axId val="-1863903488"/>
       </c:barChart>
       <c:catAx>
-        <c:axId val="901235680"/>
+        <c:axId val="-1863889344"/>
         <c:scaling>
           <c:orientation val="minMax"/>
         </c:scaling>
@@ -1188,7 +1189,7 @@
             <a:endParaRPr lang="en-US"/>
           </a:p>
         </c:txPr>
-        <c:crossAx val="901230240"/>
+        <c:crossAx val="-1863903488"/>
         <c:crosses val="autoZero"/>
         <c:auto val="1"/>
         <c:lblAlgn val="ctr"/>
@@ -1196,7 +1197,7 @@
         <c:noMultiLvlLbl val="0"/>
       </c:catAx>
       <c:valAx>
-        <c:axId val="901230240"/>
+        <c:axId val="-1863903488"/>
         <c:scaling>
           <c:orientation val="minMax"/>
         </c:scaling>
@@ -1241,6 +1242,7 @@
               </a:p>
             </c:rich>
           </c:tx>
+          <c:layout/>
           <c:overlay val="0"/>
           <c:spPr>
             <a:noFill/>
@@ -1299,7 +1301,7 @@
             <a:endParaRPr lang="en-US"/>
           </a:p>
         </c:txPr>
-        <c:crossAx val="901235680"/>
+        <c:crossAx val="-1863889344"/>
         <c:crosses val="autoZero"/>
         <c:crossBetween val="between"/>
       </c:valAx>
@@ -1313,6 +1315,7 @@
     </c:plotArea>
     <c:legend>
       <c:legendPos val="t"/>
+      <c:layout/>
       <c:overlay val="0"/>
       <c:spPr>
         <a:noFill/>
@@ -1437,6 +1440,7 @@
           </a:p>
         </c:rich>
       </c:tx>
+      <c:layout/>
       <c:overlay val="0"/>
       <c:spPr>
         <a:noFill/>
@@ -1534,46 +1538,49 @@
           <c:invertIfNegative val="0"/>
           <c:cat>
             <c:strRef>
-              <c:f>Sheet1!$A$237:$A$249</c:f>
+              <c:f>Sheet1!$A$237:$A$250</c:f>
               <c:strCache>
-                <c:ptCount val="13"/>
+                <c:ptCount val="14"/>
                 <c:pt idx="0">
+                  <c:v>Random Forest</c:v>
+                </c:pt>
+                <c:pt idx="1">
                   <c:v>J48-Pruned</c:v>
                 </c:pt>
-                <c:pt idx="1">
+                <c:pt idx="2">
                   <c:v>J48-Unpruned</c:v>
                 </c:pt>
-                <c:pt idx="2">
+                <c:pt idx="3">
                   <c:v>Naive Bayes</c:v>
                 </c:pt>
-                <c:pt idx="3">
+                <c:pt idx="4">
                   <c:v>Logistic Regression </c:v>
                 </c:pt>
-                <c:pt idx="4">
+                <c:pt idx="5">
                   <c:v>AdaBoost</c:v>
                 </c:pt>
-                <c:pt idx="5">
+                <c:pt idx="6">
                   <c:v>LogitBoost</c:v>
                 </c:pt>
-                <c:pt idx="6">
+                <c:pt idx="7">
                   <c:v>Bagging</c:v>
                 </c:pt>
-                <c:pt idx="7">
+                <c:pt idx="8">
                   <c:v>SVM c10k</c:v>
                 </c:pt>
-                <c:pt idx="8">
+                <c:pt idx="9">
                   <c:v>SVM c100k</c:v>
                 </c:pt>
-                <c:pt idx="9">
+                <c:pt idx="10">
                   <c:v>SVM c1000k</c:v>
                 </c:pt>
-                <c:pt idx="10">
+                <c:pt idx="11">
                   <c:v>1-NN</c:v>
                 </c:pt>
-                <c:pt idx="11">
+                <c:pt idx="12">
                   <c:v>3-NN</c:v>
                 </c:pt>
-                <c:pt idx="12">
+                <c:pt idx="13">
                   <c:v>5-NN</c:v>
                 </c:pt>
               </c:strCache>
@@ -1581,48 +1588,51 @@
           </c:cat>
           <c:val>
             <c:numRef>
-              <c:f>Sheet1!$B$237:$B$249</c:f>
+              <c:f>Sheet1!$B$237:$B$250</c:f>
               <c:numCache>
                 <c:formatCode>General</c:formatCode>
-                <c:ptCount val="13"/>
+                <c:ptCount val="14"/>
                 <c:pt idx="0">
+                  <c:v>0.89800000000000002</c:v>
+                </c:pt>
+                <c:pt idx="1">
                   <c:v>0.88100000000000001</c:v>
                 </c:pt>
-                <c:pt idx="1">
+                <c:pt idx="2">
                   <c:v>0.86</c:v>
                 </c:pt>
-                <c:pt idx="2">
+                <c:pt idx="3">
                   <c:v>0.81299999999999994</c:v>
                 </c:pt>
-                <c:pt idx="3">
+                <c:pt idx="4">
                   <c:v>0.874</c:v>
-                </c:pt>
-                <c:pt idx="4">
-                  <c:v>0.873</c:v>
                 </c:pt>
                 <c:pt idx="5">
                   <c:v>0.873</c:v>
                 </c:pt>
                 <c:pt idx="6">
+                  <c:v>0.873</c:v>
+                </c:pt>
+                <c:pt idx="7">
                   <c:v>0.88</c:v>
                 </c:pt>
-                <c:pt idx="7">
+                <c:pt idx="8">
                   <c:v>0.73</c:v>
                 </c:pt>
-                <c:pt idx="8">
+                <c:pt idx="9">
                   <c:v>0.87</c:v>
                 </c:pt>
-                <c:pt idx="9">
+                <c:pt idx="10">
                   <c:v>0.88</c:v>
                 </c:pt>
-                <c:pt idx="10">
-                  <c:v>0.83</c:v>
-                </c:pt>
                 <c:pt idx="11">
-                  <c:v>0.87</c:v>
+                  <c:v>0.84</c:v>
                 </c:pt>
                 <c:pt idx="12">
-                  <c:v>0.88</c:v>
+                  <c:v>0.86199999999999999</c:v>
+                </c:pt>
+                <c:pt idx="13">
+                  <c:v>0.86899999999999999</c:v>
                 </c:pt>
               </c:numCache>
             </c:numRef>
@@ -1683,46 +1693,49 @@
           <c:invertIfNegative val="0"/>
           <c:cat>
             <c:strRef>
-              <c:f>Sheet1!$A$237:$A$249</c:f>
+              <c:f>Sheet1!$A$237:$A$250</c:f>
               <c:strCache>
-                <c:ptCount val="13"/>
+                <c:ptCount val="14"/>
                 <c:pt idx="0">
+                  <c:v>Random Forest</c:v>
+                </c:pt>
+                <c:pt idx="1">
                   <c:v>J48-Pruned</c:v>
                 </c:pt>
-                <c:pt idx="1">
+                <c:pt idx="2">
                   <c:v>J48-Unpruned</c:v>
                 </c:pt>
-                <c:pt idx="2">
+                <c:pt idx="3">
                   <c:v>Naive Bayes</c:v>
                 </c:pt>
-                <c:pt idx="3">
+                <c:pt idx="4">
                   <c:v>Logistic Regression </c:v>
                 </c:pt>
-                <c:pt idx="4">
+                <c:pt idx="5">
                   <c:v>AdaBoost</c:v>
                 </c:pt>
-                <c:pt idx="5">
+                <c:pt idx="6">
                   <c:v>LogitBoost</c:v>
                 </c:pt>
-                <c:pt idx="6">
+                <c:pt idx="7">
                   <c:v>Bagging</c:v>
                 </c:pt>
-                <c:pt idx="7">
+                <c:pt idx="8">
                   <c:v>SVM c10k</c:v>
                 </c:pt>
-                <c:pt idx="8">
+                <c:pt idx="9">
                   <c:v>SVM c100k</c:v>
                 </c:pt>
-                <c:pt idx="9">
+                <c:pt idx="10">
                   <c:v>SVM c1000k</c:v>
                 </c:pt>
-                <c:pt idx="10">
+                <c:pt idx="11">
                   <c:v>1-NN</c:v>
                 </c:pt>
-                <c:pt idx="11">
+                <c:pt idx="12">
                   <c:v>3-NN</c:v>
                 </c:pt>
-                <c:pt idx="12">
+                <c:pt idx="13">
                   <c:v>5-NN</c:v>
                 </c:pt>
               </c:strCache>
@@ -1730,48 +1743,51 @@
           </c:cat>
           <c:val>
             <c:numRef>
-              <c:f>Sheet1!$C$237:$C$249</c:f>
+              <c:f>Sheet1!$C$237:$C$250</c:f>
               <c:numCache>
                 <c:formatCode>0.000</c:formatCode>
-                <c:ptCount val="13"/>
-                <c:pt idx="0">
+                <c:ptCount val="14"/>
+                <c:pt idx="0" formatCode="General">
+                  <c:v>0.95</c:v>
+                </c:pt>
+                <c:pt idx="1">
                   <c:v>0.85499999999999998</c:v>
                 </c:pt>
-                <c:pt idx="1">
+                <c:pt idx="2">
                   <c:v>0.86120000000000008</c:v>
                 </c:pt>
-                <c:pt idx="2">
+                <c:pt idx="3">
                   <c:v>0.70840000000000003</c:v>
                 </c:pt>
-                <c:pt idx="3">
+                <c:pt idx="4">
                   <c:v>0.83660000000000001</c:v>
                 </c:pt>
-                <c:pt idx="4">
+                <c:pt idx="5">
                   <c:v>0.79</c:v>
                 </c:pt>
-                <c:pt idx="5">
+                <c:pt idx="6">
                   <c:v>0.80709999999999993</c:v>
                 </c:pt>
-                <c:pt idx="6">
+                <c:pt idx="7">
                   <c:v>0.87769999999999992</c:v>
                 </c:pt>
-                <c:pt idx="7" formatCode="General">
+                <c:pt idx="8" formatCode="General">
                   <c:v>0.39</c:v>
                 </c:pt>
-                <c:pt idx="8" formatCode="General">
+                <c:pt idx="9" formatCode="General">
                   <c:v>0.54</c:v>
                 </c:pt>
-                <c:pt idx="9" formatCode="General">
+                <c:pt idx="10" formatCode="General">
                   <c:v>0.62</c:v>
                 </c:pt>
-                <c:pt idx="10" formatCode="General">
-                  <c:v>0.91</c:v>
-                </c:pt>
                 <c:pt idx="11" formatCode="General">
-                  <c:v>0.84</c:v>
+                  <c:v>0.89400000000000002</c:v>
                 </c:pt>
                 <c:pt idx="12" formatCode="General">
-                  <c:v>0.76</c:v>
+                  <c:v>0.75800000000000001</c:v>
+                </c:pt>
+                <c:pt idx="13" formatCode="General">
+                  <c:v>0.71</c:v>
                 </c:pt>
               </c:numCache>
             </c:numRef>
@@ -1787,11 +1803,11 @@
         </c:dLbls>
         <c:gapWidth val="115"/>
         <c:overlap val="-20"/>
-        <c:axId val="580916128"/>
-        <c:axId val="580916672"/>
+        <c:axId val="-37850272"/>
+        <c:axId val="-37849184"/>
       </c:barChart>
       <c:catAx>
-        <c:axId val="580916128"/>
+        <c:axId val="-37850272"/>
         <c:scaling>
           <c:orientation val="maxMin"/>
         </c:scaling>
@@ -1833,7 +1849,7 @@
             <a:endParaRPr lang="en-US"/>
           </a:p>
         </c:txPr>
-        <c:crossAx val="580916672"/>
+        <c:crossAx val="-37849184"/>
         <c:crosses val="autoZero"/>
         <c:auto val="1"/>
         <c:lblAlgn val="ctr"/>
@@ -1841,7 +1857,7 @@
         <c:noMultiLvlLbl val="0"/>
       </c:catAx>
       <c:valAx>
-        <c:axId val="580916672"/>
+        <c:axId val="-37849184"/>
         <c:scaling>
           <c:orientation val="minMax"/>
         </c:scaling>
@@ -1886,6 +1902,7 @@
               </a:p>
             </c:rich>
           </c:tx>
+          <c:layout/>
           <c:overlay val="0"/>
           <c:spPr>
             <a:noFill/>
@@ -1944,7 +1961,7 @@
             <a:endParaRPr lang="en-US"/>
           </a:p>
         </c:txPr>
-        <c:crossAx val="580916128"/>
+        <c:crossAx val="-37850272"/>
         <c:crosses val="max"/>
         <c:crossBetween val="between"/>
       </c:valAx>
@@ -1958,6 +1975,7 @@
     </c:plotArea>
     <c:legend>
       <c:legendPos val="t"/>
+      <c:layout/>
       <c:overlay val="0"/>
       <c:spPr>
         <a:noFill/>
@@ -2087,6 +2105,7 @@
           </a:p>
         </c:rich>
       </c:tx>
+      <c:layout/>
       <c:overlay val="0"/>
       <c:spPr>
         <a:noFill/>
@@ -2184,46 +2203,49 @@
           <c:invertIfNegative val="0"/>
           <c:cat>
             <c:strRef>
-              <c:f>Sheet1!$A$268:$A$280</c:f>
+              <c:f>Sheet1!$A$268:$A$281</c:f>
               <c:strCache>
-                <c:ptCount val="13"/>
+                <c:ptCount val="14"/>
                 <c:pt idx="0">
+                  <c:v>Random Forest</c:v>
+                </c:pt>
+                <c:pt idx="1">
                   <c:v>J48-Pruned</c:v>
                 </c:pt>
-                <c:pt idx="1">
+                <c:pt idx="2">
                   <c:v>J48-Unpruned</c:v>
                 </c:pt>
-                <c:pt idx="2">
+                <c:pt idx="3">
                   <c:v>Naive Bayes</c:v>
                 </c:pt>
-                <c:pt idx="3">
+                <c:pt idx="4">
                   <c:v>Logistic Regression </c:v>
                 </c:pt>
-                <c:pt idx="4">
+                <c:pt idx="5">
                   <c:v>AdaBoost</c:v>
                 </c:pt>
-                <c:pt idx="5">
+                <c:pt idx="6">
                   <c:v>LogitBoost</c:v>
                 </c:pt>
-                <c:pt idx="6">
+                <c:pt idx="7">
                   <c:v>Bagging</c:v>
                 </c:pt>
-                <c:pt idx="7">
+                <c:pt idx="8">
                   <c:v>SVM c10k</c:v>
                 </c:pt>
-                <c:pt idx="8">
+                <c:pt idx="9">
                   <c:v>SVM c100k</c:v>
                 </c:pt>
-                <c:pt idx="9">
+                <c:pt idx="10">
                   <c:v>SVM c1000k</c:v>
                 </c:pt>
-                <c:pt idx="10">
+                <c:pt idx="11">
                   <c:v>1-NN</c:v>
                 </c:pt>
-                <c:pt idx="11">
+                <c:pt idx="12">
                   <c:v>3-NN</c:v>
                 </c:pt>
-                <c:pt idx="12">
+                <c:pt idx="13">
                   <c:v>5-NN</c:v>
                 </c:pt>
               </c:strCache>
@@ -2231,48 +2253,51 @@
           </c:cat>
           <c:val>
             <c:numRef>
-              <c:f>Sheet1!$B$268:$B$280</c:f>
+              <c:f>Sheet1!$B$268:$B$281</c:f>
               <c:numCache>
                 <c:formatCode>0.000</c:formatCode>
-                <c:ptCount val="13"/>
-                <c:pt idx="0">
+                <c:ptCount val="14"/>
+                <c:pt idx="0" formatCode="General">
+                  <c:v>0.876</c:v>
+                </c:pt>
+                <c:pt idx="1">
                   <c:v>0.90538799999999997</c:v>
                 </c:pt>
-                <c:pt idx="1">
+                <c:pt idx="2">
                   <c:v>0.86765499999999995</c:v>
                 </c:pt>
-                <c:pt idx="2">
+                <c:pt idx="3">
                   <c:v>0.79294200000000004</c:v>
                 </c:pt>
-                <c:pt idx="3">
+                <c:pt idx="4">
                   <c:v>0.89562600000000003</c:v>
                 </c:pt>
-                <c:pt idx="4">
+                <c:pt idx="5">
                   <c:v>0.89299799999999996</c:v>
                 </c:pt>
-                <c:pt idx="5">
+                <c:pt idx="6">
                   <c:v>0.89400000000000002</c:v>
                 </c:pt>
-                <c:pt idx="6">
+                <c:pt idx="7">
                   <c:v>0.90407400000000004</c:v>
                 </c:pt>
-                <c:pt idx="7" formatCode="General">
+                <c:pt idx="8" formatCode="General">
                   <c:v>0.24</c:v>
                 </c:pt>
-                <c:pt idx="8" formatCode="General">
+                <c:pt idx="9" formatCode="General">
                   <c:v>2E-3</c:v>
                 </c:pt>
-                <c:pt idx="9" formatCode="General">
+                <c:pt idx="10" formatCode="General">
                   <c:v>0.17</c:v>
                 </c:pt>
-                <c:pt idx="10" formatCode="General">
-                  <c:v>0.3</c:v>
-                </c:pt>
                 <c:pt idx="11" formatCode="General">
-                  <c:v>0.3</c:v>
+                  <c:v>0.84</c:v>
                 </c:pt>
                 <c:pt idx="12" formatCode="General">
-                  <c:v>0.28000000000000003</c:v>
+                  <c:v>0.86199999999999999</c:v>
+                </c:pt>
+                <c:pt idx="13" formatCode="General">
+                  <c:v>0.86899999999999999</c:v>
                 </c:pt>
               </c:numCache>
             </c:numRef>
@@ -2333,46 +2358,49 @@
           <c:invertIfNegative val="0"/>
           <c:cat>
             <c:strRef>
-              <c:f>Sheet1!$A$268:$A$280</c:f>
+              <c:f>Sheet1!$A$268:$A$281</c:f>
               <c:strCache>
-                <c:ptCount val="13"/>
+                <c:ptCount val="14"/>
                 <c:pt idx="0">
+                  <c:v>Random Forest</c:v>
+                </c:pt>
+                <c:pt idx="1">
                   <c:v>J48-Pruned</c:v>
                 </c:pt>
-                <c:pt idx="1">
+                <c:pt idx="2">
                   <c:v>J48-Unpruned</c:v>
                 </c:pt>
-                <c:pt idx="2">
+                <c:pt idx="3">
                   <c:v>Naive Bayes</c:v>
                 </c:pt>
-                <c:pt idx="3">
+                <c:pt idx="4">
                   <c:v>Logistic Regression </c:v>
                 </c:pt>
-                <c:pt idx="4">
+                <c:pt idx="5">
                   <c:v>AdaBoost</c:v>
                 </c:pt>
-                <c:pt idx="5">
+                <c:pt idx="6">
                   <c:v>LogitBoost</c:v>
                 </c:pt>
-                <c:pt idx="6">
+                <c:pt idx="7">
                   <c:v>Bagging</c:v>
                 </c:pt>
-                <c:pt idx="7">
+                <c:pt idx="8">
                   <c:v>SVM c10k</c:v>
                 </c:pt>
-                <c:pt idx="8">
+                <c:pt idx="9">
                   <c:v>SVM c100k</c:v>
                 </c:pt>
-                <c:pt idx="9">
+                <c:pt idx="10">
                   <c:v>SVM c1000k</c:v>
                 </c:pt>
-                <c:pt idx="10">
+                <c:pt idx="11">
                   <c:v>1-NN</c:v>
                 </c:pt>
-                <c:pt idx="11">
+                <c:pt idx="12">
                   <c:v>3-NN</c:v>
                 </c:pt>
-                <c:pt idx="12">
+                <c:pt idx="13">
                   <c:v>5-NN</c:v>
                 </c:pt>
               </c:strCache>
@@ -2380,48 +2408,51 @@
           </c:cat>
           <c:val>
             <c:numRef>
-              <c:f>Sheet1!$C$268:$C$280</c:f>
+              <c:f>Sheet1!$C$268:$C$281</c:f>
               <c:numCache>
                 <c:formatCode>General</c:formatCode>
-                <c:ptCount val="13"/>
+                <c:ptCount val="14"/>
                 <c:pt idx="0">
+                  <c:v>0.95299999999999996</c:v>
+                </c:pt>
+                <c:pt idx="1">
                   <c:v>0.874</c:v>
                 </c:pt>
-                <c:pt idx="1">
+                <c:pt idx="2">
                   <c:v>0.879</c:v>
                 </c:pt>
-                <c:pt idx="2">
+                <c:pt idx="3">
                   <c:v>0.753</c:v>
                 </c:pt>
-                <c:pt idx="3">
+                <c:pt idx="4">
                   <c:v>0.84099999999999997</c:v>
                 </c:pt>
-                <c:pt idx="4">
+                <c:pt idx="5">
                   <c:v>0.81</c:v>
                 </c:pt>
-                <c:pt idx="5">
+                <c:pt idx="6">
                   <c:v>0.82099999999999995</c:v>
                 </c:pt>
-                <c:pt idx="6">
+                <c:pt idx="7">
                   <c:v>0.89</c:v>
                 </c:pt>
-                <c:pt idx="7">
+                <c:pt idx="8">
                   <c:v>0.56000000000000005</c:v>
-                </c:pt>
-                <c:pt idx="8">
-                  <c:v>0.49</c:v>
                 </c:pt>
                 <c:pt idx="9">
                   <c:v>0.49</c:v>
                 </c:pt>
                 <c:pt idx="10">
+                  <c:v>0.49</c:v>
+                </c:pt>
+                <c:pt idx="11">
                   <c:v>0.9</c:v>
                 </c:pt>
-                <c:pt idx="11">
-                  <c:v>0.82</c:v>
-                </c:pt>
                 <c:pt idx="12">
-                  <c:v>0.73</c:v>
+                  <c:v>0.79800000000000004</c:v>
+                </c:pt>
+                <c:pt idx="13">
+                  <c:v>0.76600000000000001</c:v>
                 </c:pt>
               </c:numCache>
             </c:numRef>
@@ -2437,11 +2468,11 @@
         </c:dLbls>
         <c:gapWidth val="115"/>
         <c:overlap val="-20"/>
-        <c:axId val="580701520"/>
-        <c:axId val="580697168"/>
+        <c:axId val="-37739616"/>
+        <c:axId val="-37735808"/>
       </c:barChart>
       <c:catAx>
-        <c:axId val="580701520"/>
+        <c:axId val="-37739616"/>
         <c:scaling>
           <c:orientation val="maxMin"/>
         </c:scaling>
@@ -2483,7 +2514,7 @@
             <a:endParaRPr lang="en-US"/>
           </a:p>
         </c:txPr>
-        <c:crossAx val="580697168"/>
+        <c:crossAx val="-37735808"/>
         <c:crosses val="autoZero"/>
         <c:auto val="1"/>
         <c:lblAlgn val="ctr"/>
@@ -2491,7 +2522,7 @@
         <c:noMultiLvlLbl val="0"/>
       </c:catAx>
       <c:valAx>
-        <c:axId val="580697168"/>
+        <c:axId val="-37735808"/>
         <c:scaling>
           <c:orientation val="minMax"/>
         </c:scaling>
@@ -2536,6 +2567,7 @@
               </a:p>
             </c:rich>
           </c:tx>
+          <c:layout/>
           <c:overlay val="0"/>
           <c:spPr>
             <a:noFill/>
@@ -2594,7 +2626,7 @@
             <a:endParaRPr lang="en-US"/>
           </a:p>
         </c:txPr>
-        <c:crossAx val="580701520"/>
+        <c:crossAx val="-37739616"/>
         <c:crosses val="max"/>
         <c:crossBetween val="between"/>
       </c:valAx>
@@ -2608,6 +2640,7 @@
     </c:plotArea>
     <c:legend>
       <c:legendPos val="t"/>
+      <c:layout/>
       <c:overlay val="0"/>
       <c:spPr>
         <a:noFill/>
@@ -2737,6 +2770,7 @@
           </a:p>
         </c:rich>
       </c:tx>
+      <c:layout/>
       <c:overlay val="0"/>
       <c:spPr>
         <a:noFill/>
@@ -2834,46 +2868,49 @@
           <c:invertIfNegative val="0"/>
           <c:cat>
             <c:strRef>
-              <c:f>Sheet1!$A$298:$A$310</c:f>
+              <c:f>Sheet1!$A$298:$A$311</c:f>
               <c:strCache>
-                <c:ptCount val="13"/>
+                <c:ptCount val="14"/>
                 <c:pt idx="0">
+                  <c:v>Random Forest</c:v>
+                </c:pt>
+                <c:pt idx="1">
                   <c:v>J48-Pruned</c:v>
                 </c:pt>
-                <c:pt idx="1">
+                <c:pt idx="2">
                   <c:v>J48-Unpruned</c:v>
                 </c:pt>
-                <c:pt idx="2">
+                <c:pt idx="3">
                   <c:v>Naive Bayes</c:v>
                 </c:pt>
-                <c:pt idx="3">
+                <c:pt idx="4">
                   <c:v>Logistic Regression </c:v>
                 </c:pt>
-                <c:pt idx="4">
+                <c:pt idx="5">
                   <c:v>AdaBoost</c:v>
                 </c:pt>
-                <c:pt idx="5">
+                <c:pt idx="6">
                   <c:v>LogitBoost</c:v>
                 </c:pt>
-                <c:pt idx="6">
+                <c:pt idx="7">
                   <c:v>Bagging</c:v>
                 </c:pt>
-                <c:pt idx="7">
+                <c:pt idx="8">
                   <c:v>SVM c10k</c:v>
                 </c:pt>
-                <c:pt idx="8">
+                <c:pt idx="9">
                   <c:v>SVM c100k</c:v>
                 </c:pt>
-                <c:pt idx="9">
+                <c:pt idx="10">
                   <c:v>SVM c1000k</c:v>
                 </c:pt>
-                <c:pt idx="10">
+                <c:pt idx="11">
                   <c:v>1-NN</c:v>
                 </c:pt>
-                <c:pt idx="11">
+                <c:pt idx="12">
                   <c:v>3-NN</c:v>
                 </c:pt>
-                <c:pt idx="12">
+                <c:pt idx="13">
                   <c:v>5-NN</c:v>
                 </c:pt>
               </c:strCache>
@@ -2881,48 +2918,51 @@
           </c:cat>
           <c:val>
             <c:numRef>
-              <c:f>Sheet1!$B$298:$B$310</c:f>
+              <c:f>Sheet1!$B$298:$B$311</c:f>
               <c:numCache>
                 <c:formatCode>0.000</c:formatCode>
-                <c:ptCount val="13"/>
-                <c:pt idx="0">
+                <c:ptCount val="14"/>
+                <c:pt idx="0" formatCode="General">
+                  <c:v>0.68700000000000006</c:v>
+                </c:pt>
+                <c:pt idx="1">
                   <c:v>0.90538799999999997</c:v>
                 </c:pt>
-                <c:pt idx="1">
+                <c:pt idx="2">
                   <c:v>0.86765499999999995</c:v>
                 </c:pt>
-                <c:pt idx="2">
+                <c:pt idx="3">
                   <c:v>0.79294200000000004</c:v>
                 </c:pt>
-                <c:pt idx="3">
+                <c:pt idx="4">
                   <c:v>0.89562600000000003</c:v>
                 </c:pt>
-                <c:pt idx="4">
+                <c:pt idx="5">
                   <c:v>0.89299799999999996</c:v>
                 </c:pt>
-                <c:pt idx="5">
+                <c:pt idx="6">
                   <c:v>0.89400000000000002</c:v>
                 </c:pt>
-                <c:pt idx="6">
+                <c:pt idx="7">
                   <c:v>0.90407400000000004</c:v>
                 </c:pt>
-                <c:pt idx="7" formatCode="General">
+                <c:pt idx="8" formatCode="General">
                   <c:v>0.67</c:v>
                 </c:pt>
-                <c:pt idx="8" formatCode="General">
+                <c:pt idx="9" formatCode="General">
                   <c:v>0.65</c:v>
                 </c:pt>
-                <c:pt idx="9" formatCode="General">
+                <c:pt idx="10" formatCode="General">
                   <c:v>0.63</c:v>
                 </c:pt>
-                <c:pt idx="10" formatCode="General">
-                  <c:v>0.39</c:v>
-                </c:pt>
                 <c:pt idx="11" formatCode="General">
-                  <c:v>0.35</c:v>
+                  <c:v>0.60099999999999998</c:v>
                 </c:pt>
                 <c:pt idx="12" formatCode="General">
-                  <c:v>0.33</c:v>
+                  <c:v>0.64300000000000002</c:v>
+                </c:pt>
+                <c:pt idx="13" formatCode="General">
+                  <c:v>0.65</c:v>
                 </c:pt>
               </c:numCache>
             </c:numRef>
@@ -2983,46 +3023,49 @@
           <c:invertIfNegative val="0"/>
           <c:cat>
             <c:strRef>
-              <c:f>Sheet1!$A$298:$A$310</c:f>
+              <c:f>Sheet1!$A$298:$A$311</c:f>
               <c:strCache>
-                <c:ptCount val="13"/>
+                <c:ptCount val="14"/>
                 <c:pt idx="0">
+                  <c:v>Random Forest</c:v>
+                </c:pt>
+                <c:pt idx="1">
                   <c:v>J48-Pruned</c:v>
                 </c:pt>
-                <c:pt idx="1">
+                <c:pt idx="2">
                   <c:v>J48-Unpruned</c:v>
                 </c:pt>
-                <c:pt idx="2">
+                <c:pt idx="3">
                   <c:v>Naive Bayes</c:v>
                 </c:pt>
-                <c:pt idx="3">
+                <c:pt idx="4">
                   <c:v>Logistic Regression </c:v>
                 </c:pt>
-                <c:pt idx="4">
+                <c:pt idx="5">
                   <c:v>AdaBoost</c:v>
                 </c:pt>
-                <c:pt idx="5">
+                <c:pt idx="6">
                   <c:v>LogitBoost</c:v>
                 </c:pt>
-                <c:pt idx="6">
+                <c:pt idx="7">
                   <c:v>Bagging</c:v>
                 </c:pt>
-                <c:pt idx="7">
+                <c:pt idx="8">
                   <c:v>SVM c10k</c:v>
                 </c:pt>
-                <c:pt idx="8">
+                <c:pt idx="9">
                   <c:v>SVM c100k</c:v>
                 </c:pt>
-                <c:pt idx="9">
+                <c:pt idx="10">
                   <c:v>SVM c1000k</c:v>
                 </c:pt>
-                <c:pt idx="10">
+                <c:pt idx="11">
                   <c:v>1-NN</c:v>
                 </c:pt>
-                <c:pt idx="11">
+                <c:pt idx="12">
                   <c:v>3-NN</c:v>
                 </c:pt>
-                <c:pt idx="12">
+                <c:pt idx="13">
                   <c:v>5-NN</c:v>
                 </c:pt>
               </c:strCache>
@@ -3030,48 +3073,51 @@
           </c:cat>
           <c:val>
             <c:numRef>
-              <c:f>Sheet1!$C$298:$C$310</c:f>
+              <c:f>Sheet1!$C$298:$C$311</c:f>
               <c:numCache>
                 <c:formatCode>0.000</c:formatCode>
-                <c:ptCount val="13"/>
-                <c:pt idx="0">
+                <c:ptCount val="14"/>
+                <c:pt idx="0" formatCode="General">
+                  <c:v>0.99</c:v>
+                </c:pt>
+                <c:pt idx="1">
                   <c:v>0.85499999999999998</c:v>
                 </c:pt>
-                <c:pt idx="1">
+                <c:pt idx="2">
                   <c:v>0.86120000000000008</c:v>
                 </c:pt>
-                <c:pt idx="2">
+                <c:pt idx="3">
                   <c:v>0.70840000000000003</c:v>
                 </c:pt>
-                <c:pt idx="3">
+                <c:pt idx="4">
                   <c:v>0.83660000000000001</c:v>
                 </c:pt>
-                <c:pt idx="4">
+                <c:pt idx="5">
                   <c:v>0.79</c:v>
                 </c:pt>
-                <c:pt idx="5">
+                <c:pt idx="6">
                   <c:v>0.80709999999999993</c:v>
                 </c:pt>
-                <c:pt idx="6">
+                <c:pt idx="7">
                   <c:v>0.87769999999999992</c:v>
                 </c:pt>
-                <c:pt idx="7" formatCode="General">
+                <c:pt idx="8" formatCode="General">
                   <c:v>0.61</c:v>
                 </c:pt>
-                <c:pt idx="8" formatCode="General">
+                <c:pt idx="9" formatCode="General">
                   <c:v>0.59</c:v>
                 </c:pt>
-                <c:pt idx="9" formatCode="General">
+                <c:pt idx="10" formatCode="General">
                   <c:v>0.56999999999999995</c:v>
                 </c:pt>
-                <c:pt idx="10" formatCode="General">
-                  <c:v>0.06</c:v>
-                </c:pt>
                 <c:pt idx="11" formatCode="General">
-                  <c:v>0.09</c:v>
+                  <c:v>0.91300000000000003</c:v>
                 </c:pt>
                 <c:pt idx="12" formatCode="General">
-                  <c:v>0.13</c:v>
+                  <c:v>0.88500000000000001</c:v>
+                </c:pt>
+                <c:pt idx="13" formatCode="General">
+                  <c:v>0.84199999999999997</c:v>
                 </c:pt>
               </c:numCache>
             </c:numRef>
@@ -3087,11 +3133,11 @@
         </c:dLbls>
         <c:gapWidth val="115"/>
         <c:overlap val="-20"/>
-        <c:axId val="901228608"/>
-        <c:axId val="901236224"/>
+        <c:axId val="-1863897504"/>
+        <c:axId val="-1863901856"/>
       </c:barChart>
       <c:catAx>
-        <c:axId val="901228608"/>
+        <c:axId val="-1863897504"/>
         <c:scaling>
           <c:orientation val="maxMin"/>
         </c:scaling>
@@ -3133,7 +3179,7 @@
             <a:endParaRPr lang="en-US"/>
           </a:p>
         </c:txPr>
-        <c:crossAx val="901236224"/>
+        <c:crossAx val="-1863901856"/>
         <c:crosses val="autoZero"/>
         <c:auto val="1"/>
         <c:lblAlgn val="ctr"/>
@@ -3141,7 +3187,7 @@
         <c:noMultiLvlLbl val="0"/>
       </c:catAx>
       <c:valAx>
-        <c:axId val="901236224"/>
+        <c:axId val="-1863901856"/>
         <c:scaling>
           <c:orientation val="minMax"/>
         </c:scaling>
@@ -3186,6 +3232,7 @@
               </a:p>
             </c:rich>
           </c:tx>
+          <c:layout/>
           <c:overlay val="0"/>
           <c:spPr>
             <a:noFill/>
@@ -3244,7 +3291,7 @@
             <a:endParaRPr lang="en-US"/>
           </a:p>
         </c:txPr>
-        <c:crossAx val="901228608"/>
+        <c:crossAx val="-1863897504"/>
         <c:crosses val="max"/>
         <c:crossBetween val="between"/>
       </c:valAx>
@@ -3258,6 +3305,7 @@
     </c:plotArea>
     <c:legend>
       <c:legendPos val="t"/>
+      <c:layout/>
       <c:overlay val="0"/>
       <c:spPr>
         <a:noFill/>
@@ -3480,46 +3528,49 @@
           <c:invertIfNegative val="0"/>
           <c:cat>
             <c:strRef>
-              <c:f>Sheet1!$A$344:$A$356</c:f>
+              <c:f>Sheet1!$A$344:$A$357</c:f>
               <c:strCache>
-                <c:ptCount val="13"/>
+                <c:ptCount val="14"/>
                 <c:pt idx="0">
+                  <c:v>Random Forest</c:v>
+                </c:pt>
+                <c:pt idx="1">
                   <c:v>J48-Pruned</c:v>
                 </c:pt>
-                <c:pt idx="1">
+                <c:pt idx="2">
                   <c:v>J48-Unpruned</c:v>
                 </c:pt>
-                <c:pt idx="2">
+                <c:pt idx="3">
                   <c:v>Naive Bayes</c:v>
                 </c:pt>
-                <c:pt idx="3">
+                <c:pt idx="4">
                   <c:v>Logistic Regression </c:v>
                 </c:pt>
-                <c:pt idx="4">
+                <c:pt idx="5">
                   <c:v>AdaBoost</c:v>
                 </c:pt>
-                <c:pt idx="5">
+                <c:pt idx="6">
                   <c:v>LogitBoost</c:v>
                 </c:pt>
-                <c:pt idx="6">
+                <c:pt idx="7">
                   <c:v>Bagging</c:v>
                 </c:pt>
-                <c:pt idx="7">
+                <c:pt idx="8">
                   <c:v>SVM c10k</c:v>
                 </c:pt>
-                <c:pt idx="8">
+                <c:pt idx="9">
                   <c:v>SVM c100k</c:v>
                 </c:pt>
-                <c:pt idx="9">
+                <c:pt idx="10">
                   <c:v>SVM c1000k</c:v>
                 </c:pt>
-                <c:pt idx="10">
+                <c:pt idx="11">
                   <c:v>1-NN</c:v>
                 </c:pt>
-                <c:pt idx="11">
+                <c:pt idx="12">
                   <c:v>3-NN</c:v>
                 </c:pt>
-                <c:pt idx="12">
+                <c:pt idx="13">
                   <c:v>5-NN</c:v>
                 </c:pt>
               </c:strCache>
@@ -3527,30 +3578,51 @@
           </c:cat>
           <c:val>
             <c:numRef>
-              <c:f>Sheet1!$B$344:$B$356</c:f>
+              <c:f>Sheet1!$B$344:$B$357</c:f>
               <c:numCache>
                 <c:formatCode>General</c:formatCode>
-                <c:ptCount val="13"/>
+                <c:ptCount val="14"/>
                 <c:pt idx="0">
+                  <c:v>0.89</c:v>
+                </c:pt>
+                <c:pt idx="1">
                   <c:v>0.90300000000000002</c:v>
                 </c:pt>
-                <c:pt idx="1">
+                <c:pt idx="2">
                   <c:v>0.88400000000000001</c:v>
                 </c:pt>
-                <c:pt idx="2">
+                <c:pt idx="3">
                   <c:v>0.88300000000000001</c:v>
                 </c:pt>
-                <c:pt idx="3">
+                <c:pt idx="4">
                   <c:v>0.89300000000000002</c:v>
                 </c:pt>
-                <c:pt idx="4">
+                <c:pt idx="5">
                   <c:v>0.89200000000000002</c:v>
                 </c:pt>
-                <c:pt idx="5">
+                <c:pt idx="6">
                   <c:v>0.89300000000000002</c:v>
                 </c:pt>
-                <c:pt idx="6">
+                <c:pt idx="7">
                   <c:v>0.90100000000000002</c:v>
+                </c:pt>
+                <c:pt idx="8">
+                  <c:v>0</c:v>
+                </c:pt>
+                <c:pt idx="9">
+                  <c:v>0</c:v>
+                </c:pt>
+                <c:pt idx="10">
+                  <c:v>0</c:v>
+                </c:pt>
+                <c:pt idx="11">
+                  <c:v>0.82699999999999996</c:v>
+                </c:pt>
+                <c:pt idx="12">
+                  <c:v>0.874</c:v>
+                </c:pt>
+                <c:pt idx="13">
+                  <c:v>0.89200000000000002</c:v>
                 </c:pt>
               </c:numCache>
             </c:numRef>
@@ -3611,46 +3683,49 @@
           <c:invertIfNegative val="0"/>
           <c:cat>
             <c:strRef>
-              <c:f>Sheet1!$A$344:$A$356</c:f>
+              <c:f>Sheet1!$A$344:$A$357</c:f>
               <c:strCache>
-                <c:ptCount val="13"/>
+                <c:ptCount val="14"/>
                 <c:pt idx="0">
+                  <c:v>Random Forest</c:v>
+                </c:pt>
+                <c:pt idx="1">
                   <c:v>J48-Pruned</c:v>
                 </c:pt>
-                <c:pt idx="1">
+                <c:pt idx="2">
                   <c:v>J48-Unpruned</c:v>
                 </c:pt>
-                <c:pt idx="2">
+                <c:pt idx="3">
                   <c:v>Naive Bayes</c:v>
                 </c:pt>
-                <c:pt idx="3">
+                <c:pt idx="4">
                   <c:v>Logistic Regression </c:v>
                 </c:pt>
-                <c:pt idx="4">
+                <c:pt idx="5">
                   <c:v>AdaBoost</c:v>
                 </c:pt>
-                <c:pt idx="5">
+                <c:pt idx="6">
                   <c:v>LogitBoost</c:v>
                 </c:pt>
-                <c:pt idx="6">
+                <c:pt idx="7">
                   <c:v>Bagging</c:v>
                 </c:pt>
-                <c:pt idx="7">
+                <c:pt idx="8">
                   <c:v>SVM c10k</c:v>
                 </c:pt>
-                <c:pt idx="8">
+                <c:pt idx="9">
                   <c:v>SVM c100k</c:v>
                 </c:pt>
-                <c:pt idx="9">
+                <c:pt idx="10">
                   <c:v>SVM c1000k</c:v>
                 </c:pt>
-                <c:pt idx="10">
+                <c:pt idx="11">
                   <c:v>1-NN</c:v>
                 </c:pt>
-                <c:pt idx="11">
+                <c:pt idx="12">
                   <c:v>3-NN</c:v>
                 </c:pt>
-                <c:pt idx="12">
+                <c:pt idx="13">
                   <c:v>5-NN</c:v>
                 </c:pt>
               </c:strCache>
@@ -3658,30 +3733,51 @@
           </c:cat>
           <c:val>
             <c:numRef>
-              <c:f>Sheet1!$C$344:$C$356</c:f>
+              <c:f>Sheet1!$C$344:$C$357</c:f>
               <c:numCache>
                 <c:formatCode>General</c:formatCode>
-                <c:ptCount val="13"/>
+                <c:ptCount val="14"/>
                 <c:pt idx="0">
+                  <c:v>0.93200000000000005</c:v>
+                </c:pt>
+                <c:pt idx="1">
                   <c:v>0.84</c:v>
                 </c:pt>
-                <c:pt idx="1">
+                <c:pt idx="2">
                   <c:v>0.84899999999999998</c:v>
                 </c:pt>
-                <c:pt idx="2">
+                <c:pt idx="3">
                   <c:v>0.76100000000000001</c:v>
                 </c:pt>
-                <c:pt idx="3">
+                <c:pt idx="4">
                   <c:v>0.83699999999999997</c:v>
                 </c:pt>
-                <c:pt idx="4">
+                <c:pt idx="5">
                   <c:v>0.88500000000000001</c:v>
                 </c:pt>
-                <c:pt idx="5">
+                <c:pt idx="6">
                   <c:v>0.81100000000000005</c:v>
                 </c:pt>
-                <c:pt idx="6">
+                <c:pt idx="7">
                   <c:v>0.95</c:v>
+                </c:pt>
+                <c:pt idx="8">
+                  <c:v>0</c:v>
+                </c:pt>
+                <c:pt idx="9">
+                  <c:v>0</c:v>
+                </c:pt>
+                <c:pt idx="10">
+                  <c:v>0</c:v>
+                </c:pt>
+                <c:pt idx="11">
+                  <c:v>0.88900000000000001</c:v>
+                </c:pt>
+                <c:pt idx="12">
+                  <c:v>0.73699999999999999</c:v>
+                </c:pt>
+                <c:pt idx="13">
+                  <c:v>0.70599999999999996</c:v>
                 </c:pt>
               </c:numCache>
             </c:numRef>
@@ -3697,11 +3793,11 @@
         </c:dLbls>
         <c:gapWidth val="115"/>
         <c:overlap val="-20"/>
-        <c:axId val="901240032"/>
-        <c:axId val="901242208"/>
+        <c:axId val="-1863895328"/>
+        <c:axId val="-1863890976"/>
       </c:barChart>
       <c:catAx>
-        <c:axId val="901240032"/>
+        <c:axId val="-1863895328"/>
         <c:scaling>
           <c:orientation val="maxMin"/>
         </c:scaling>
@@ -3743,7 +3839,7 @@
             <a:endParaRPr lang="en-US"/>
           </a:p>
         </c:txPr>
-        <c:crossAx val="901242208"/>
+        <c:crossAx val="-1863890976"/>
         <c:crosses val="autoZero"/>
         <c:auto val="1"/>
         <c:lblAlgn val="ctr"/>
@@ -3751,7 +3847,7 @@
         <c:noMultiLvlLbl val="0"/>
       </c:catAx>
       <c:valAx>
-        <c:axId val="901242208"/>
+        <c:axId val="-1863890976"/>
         <c:scaling>
           <c:orientation val="minMax"/>
         </c:scaling>
@@ -3855,7 +3951,7 @@
             <a:endParaRPr lang="en-US"/>
           </a:p>
         </c:txPr>
-        <c:crossAx val="901240032"/>
+        <c:crossAx val="-1863895328"/>
         <c:crosses val="max"/>
         <c:crossBetween val="between"/>
       </c:valAx>
@@ -4092,46 +4188,49 @@
           <c:invertIfNegative val="0"/>
           <c:cat>
             <c:strRef>
-              <c:f>Sheet1!$A$375:$A$387</c:f>
+              <c:f>Sheet1!$A$375:$A$388</c:f>
               <c:strCache>
-                <c:ptCount val="13"/>
+                <c:ptCount val="14"/>
                 <c:pt idx="0">
+                  <c:v>Random Forest</c:v>
+                </c:pt>
+                <c:pt idx="1">
                   <c:v>J48-Pruned</c:v>
                 </c:pt>
-                <c:pt idx="1">
+                <c:pt idx="2">
                   <c:v>J48-Unpruned</c:v>
                 </c:pt>
-                <c:pt idx="2">
+                <c:pt idx="3">
                   <c:v>Naive Bayes</c:v>
                 </c:pt>
-                <c:pt idx="3">
+                <c:pt idx="4">
                   <c:v>Logistic Regression </c:v>
                 </c:pt>
-                <c:pt idx="4">
+                <c:pt idx="5">
                   <c:v>AdaBoost</c:v>
                 </c:pt>
-                <c:pt idx="5">
+                <c:pt idx="6">
                   <c:v>LogitBoost</c:v>
                 </c:pt>
-                <c:pt idx="6">
+                <c:pt idx="7">
                   <c:v>Bagging</c:v>
                 </c:pt>
-                <c:pt idx="7">
+                <c:pt idx="8">
                   <c:v>SVM c10k</c:v>
                 </c:pt>
-                <c:pt idx="8">
+                <c:pt idx="9">
                   <c:v>SVM c100k</c:v>
                 </c:pt>
-                <c:pt idx="9">
+                <c:pt idx="10">
                   <c:v>SVM c1000k</c:v>
                 </c:pt>
-                <c:pt idx="10">
+                <c:pt idx="11">
                   <c:v>1-NN</c:v>
                 </c:pt>
-                <c:pt idx="11">
+                <c:pt idx="12">
                   <c:v>3-NN</c:v>
                 </c:pt>
-                <c:pt idx="12">
+                <c:pt idx="13">
                   <c:v>5-NN</c:v>
                 </c:pt>
               </c:strCache>
@@ -4139,30 +4238,51 @@
           </c:cat>
           <c:val>
             <c:numRef>
-              <c:f>Sheet1!$B$375:$B$387</c:f>
+              <c:f>Sheet1!$B$375:$B$388</c:f>
               <c:numCache>
                 <c:formatCode>General</c:formatCode>
-                <c:ptCount val="13"/>
+                <c:ptCount val="14"/>
                 <c:pt idx="0">
+                  <c:v>0.86899999999999999</c:v>
+                </c:pt>
+                <c:pt idx="1">
                   <c:v>0.877</c:v>
                 </c:pt>
-                <c:pt idx="1">
+                <c:pt idx="2">
                   <c:v>0.86499999999999999</c:v>
                 </c:pt>
-                <c:pt idx="2">
+                <c:pt idx="3">
                   <c:v>0.86899999999999999</c:v>
-                </c:pt>
-                <c:pt idx="3">
-                  <c:v>0.873</c:v>
                 </c:pt>
                 <c:pt idx="4">
                   <c:v>0.873</c:v>
                 </c:pt>
                 <c:pt idx="5">
+                  <c:v>0.873</c:v>
+                </c:pt>
+                <c:pt idx="6">
                   <c:v>0.874</c:v>
                 </c:pt>
-                <c:pt idx="6">
+                <c:pt idx="7">
                   <c:v>0.876</c:v>
+                </c:pt>
+                <c:pt idx="8">
+                  <c:v>0</c:v>
+                </c:pt>
+                <c:pt idx="9">
+                  <c:v>0</c:v>
+                </c:pt>
+                <c:pt idx="10">
+                  <c:v>0</c:v>
+                </c:pt>
+                <c:pt idx="11">
+                  <c:v>0.83099999999999996</c:v>
+                </c:pt>
+                <c:pt idx="12">
+                  <c:v>0.86</c:v>
+                </c:pt>
+                <c:pt idx="13">
+                  <c:v>0.871</c:v>
                 </c:pt>
               </c:numCache>
             </c:numRef>
@@ -4223,46 +4343,49 @@
           <c:invertIfNegative val="0"/>
           <c:cat>
             <c:strRef>
-              <c:f>Sheet1!$A$375:$A$387</c:f>
+              <c:f>Sheet1!$A$375:$A$388</c:f>
               <c:strCache>
-                <c:ptCount val="13"/>
+                <c:ptCount val="14"/>
                 <c:pt idx="0">
+                  <c:v>Random Forest</c:v>
+                </c:pt>
+                <c:pt idx="1">
                   <c:v>J48-Pruned</c:v>
                 </c:pt>
-                <c:pt idx="1">
+                <c:pt idx="2">
                   <c:v>J48-Unpruned</c:v>
                 </c:pt>
-                <c:pt idx="2">
+                <c:pt idx="3">
                   <c:v>Naive Bayes</c:v>
                 </c:pt>
-                <c:pt idx="3">
+                <c:pt idx="4">
                   <c:v>Logistic Regression </c:v>
                 </c:pt>
-                <c:pt idx="4">
+                <c:pt idx="5">
                   <c:v>AdaBoost</c:v>
                 </c:pt>
-                <c:pt idx="5">
+                <c:pt idx="6">
                   <c:v>LogitBoost</c:v>
                 </c:pt>
-                <c:pt idx="6">
+                <c:pt idx="7">
                   <c:v>Bagging</c:v>
                 </c:pt>
-                <c:pt idx="7">
+                <c:pt idx="8">
                   <c:v>SVM c10k</c:v>
                 </c:pt>
-                <c:pt idx="8">
+                <c:pt idx="9">
                   <c:v>SVM c100k</c:v>
                 </c:pt>
-                <c:pt idx="9">
+                <c:pt idx="10">
                   <c:v>SVM c1000k</c:v>
                 </c:pt>
-                <c:pt idx="10">
+                <c:pt idx="11">
                   <c:v>1-NN</c:v>
                 </c:pt>
-                <c:pt idx="11">
+                <c:pt idx="12">
                   <c:v>3-NN</c:v>
                 </c:pt>
-                <c:pt idx="12">
+                <c:pt idx="13">
                   <c:v>5-NN</c:v>
                 </c:pt>
               </c:strCache>
@@ -4270,30 +4393,51 @@
           </c:cat>
           <c:val>
             <c:numRef>
-              <c:f>Sheet1!$C$375:$C$387</c:f>
+              <c:f>Sheet1!$C$375:$C$388</c:f>
               <c:numCache>
                 <c:formatCode>General</c:formatCode>
-                <c:ptCount val="13"/>
+                <c:ptCount val="14"/>
                 <c:pt idx="0">
+                  <c:v>0.93799999999999994</c:v>
+                </c:pt>
+                <c:pt idx="1">
                   <c:v>0.86299999999999999</c:v>
                 </c:pt>
-                <c:pt idx="1">
+                <c:pt idx="2">
                   <c:v>0.86899999999999999</c:v>
                 </c:pt>
-                <c:pt idx="2">
+                <c:pt idx="3">
                   <c:v>0.79100000000000004</c:v>
                 </c:pt>
-                <c:pt idx="3">
+                <c:pt idx="4">
                   <c:v>0.84099999999999997</c:v>
                 </c:pt>
-                <c:pt idx="4">
+                <c:pt idx="5">
                   <c:v>0.86199999999999999</c:v>
                 </c:pt>
-                <c:pt idx="5">
+                <c:pt idx="6">
                   <c:v>0.82399999999999995</c:v>
                 </c:pt>
-                <c:pt idx="6">
+                <c:pt idx="7">
                   <c:v>0.95</c:v>
+                </c:pt>
+                <c:pt idx="8">
+                  <c:v>0</c:v>
+                </c:pt>
+                <c:pt idx="9">
+                  <c:v>0</c:v>
+                </c:pt>
+                <c:pt idx="10">
+                  <c:v>0</c:v>
+                </c:pt>
+                <c:pt idx="11">
+                  <c:v>0.90300000000000002</c:v>
+                </c:pt>
+                <c:pt idx="12">
+                  <c:v>0.78200000000000003</c:v>
+                </c:pt>
+                <c:pt idx="13">
+                  <c:v>0.75600000000000001</c:v>
                 </c:pt>
               </c:numCache>
             </c:numRef>
@@ -4309,11 +4453,11 @@
         </c:dLbls>
         <c:gapWidth val="115"/>
         <c:overlap val="-20"/>
-        <c:axId val="901233504"/>
-        <c:axId val="901230784"/>
+        <c:axId val="-1863890432"/>
+        <c:axId val="-1863902944"/>
       </c:barChart>
       <c:catAx>
-        <c:axId val="901233504"/>
+        <c:axId val="-1863890432"/>
         <c:scaling>
           <c:orientation val="maxMin"/>
         </c:scaling>
@@ -4355,7 +4499,7 @@
             <a:endParaRPr lang="en-US"/>
           </a:p>
         </c:txPr>
-        <c:crossAx val="901230784"/>
+        <c:crossAx val="-1863902944"/>
         <c:crosses val="autoZero"/>
         <c:auto val="1"/>
         <c:lblAlgn val="ctr"/>
@@ -4363,7 +4507,7 @@
         <c:noMultiLvlLbl val="0"/>
       </c:catAx>
       <c:valAx>
-        <c:axId val="901230784"/>
+        <c:axId val="-1863902944"/>
         <c:scaling>
           <c:orientation val="minMax"/>
         </c:scaling>
@@ -4467,7 +4611,7 @@
             <a:endParaRPr lang="en-US"/>
           </a:p>
         </c:txPr>
-        <c:crossAx val="901233504"/>
+        <c:crossAx val="-1863890432"/>
         <c:crosses val="max"/>
         <c:crossBetween val="between"/>
       </c:valAx>
@@ -4704,46 +4848,49 @@
           <c:invertIfNegative val="0"/>
           <c:cat>
             <c:strRef>
-              <c:f>Sheet1!$A$405:$A$417</c:f>
+              <c:f>Sheet1!$A$405:$A$418</c:f>
               <c:strCache>
-                <c:ptCount val="13"/>
+                <c:ptCount val="14"/>
                 <c:pt idx="0">
+                  <c:v>Random Forest</c:v>
+                </c:pt>
+                <c:pt idx="1">
                   <c:v>J48-Pruned</c:v>
                 </c:pt>
-                <c:pt idx="1">
+                <c:pt idx="2">
                   <c:v>J48-Unpruned</c:v>
                 </c:pt>
-                <c:pt idx="2">
+                <c:pt idx="3">
                   <c:v>Naive Bayes</c:v>
                 </c:pt>
-                <c:pt idx="3">
+                <c:pt idx="4">
                   <c:v>Logistic Regression </c:v>
                 </c:pt>
-                <c:pt idx="4">
+                <c:pt idx="5">
                   <c:v>AdaBoost</c:v>
                 </c:pt>
-                <c:pt idx="5">
+                <c:pt idx="6">
                   <c:v>LogitBoost</c:v>
                 </c:pt>
-                <c:pt idx="6">
+                <c:pt idx="7">
                   <c:v>Bagging</c:v>
                 </c:pt>
-                <c:pt idx="7">
+                <c:pt idx="8">
                   <c:v>SVM c10k</c:v>
                 </c:pt>
-                <c:pt idx="8">
+                <c:pt idx="9">
                   <c:v>SVM c100k</c:v>
                 </c:pt>
-                <c:pt idx="9">
+                <c:pt idx="10">
                   <c:v>SVM c1000k</c:v>
                 </c:pt>
-                <c:pt idx="10">
+                <c:pt idx="11">
                   <c:v>1-NN</c:v>
                 </c:pt>
-                <c:pt idx="11">
+                <c:pt idx="12">
                   <c:v>3-NN</c:v>
                 </c:pt>
-                <c:pt idx="12">
+                <c:pt idx="13">
                   <c:v>5-NN</c:v>
                 </c:pt>
               </c:strCache>
@@ -4751,30 +4898,51 @@
           </c:cat>
           <c:val>
             <c:numRef>
-              <c:f>Sheet1!$B$405:$B$417</c:f>
+              <c:f>Sheet1!$B$405:$B$418</c:f>
               <c:numCache>
                 <c:formatCode>General</c:formatCode>
-                <c:ptCount val="13"/>
+                <c:ptCount val="14"/>
                 <c:pt idx="0">
+                  <c:v>0.66400000000000003</c:v>
+                </c:pt>
+                <c:pt idx="1">
                   <c:v>0.63300000000000001</c:v>
                 </c:pt>
-                <c:pt idx="1">
+                <c:pt idx="2">
                   <c:v>0.67400000000000004</c:v>
                 </c:pt>
-                <c:pt idx="2">
+                <c:pt idx="3">
                   <c:v>0.71699999999999997</c:v>
                 </c:pt>
-                <c:pt idx="3">
+                <c:pt idx="4">
                   <c:v>0.72699999999999998</c:v>
                 </c:pt>
-                <c:pt idx="4">
+                <c:pt idx="5">
                   <c:v>0.69699999999999995</c:v>
                 </c:pt>
-                <c:pt idx="5">
+                <c:pt idx="6">
                   <c:v>0.71399999999999997</c:v>
                 </c:pt>
-                <c:pt idx="6">
+                <c:pt idx="7">
                   <c:v>0.70799999999999996</c:v>
+                </c:pt>
+                <c:pt idx="8">
+                  <c:v>0</c:v>
+                </c:pt>
+                <c:pt idx="9">
+                  <c:v>0</c:v>
+                </c:pt>
+                <c:pt idx="10">
+                  <c:v>0</c:v>
+                </c:pt>
+                <c:pt idx="11">
+                  <c:v>0.58899999999999997</c:v>
+                </c:pt>
+                <c:pt idx="12">
+                  <c:v>0.63700000000000001</c:v>
+                </c:pt>
+                <c:pt idx="13">
+                  <c:v>0.64500000000000002</c:v>
                 </c:pt>
               </c:numCache>
             </c:numRef>
@@ -4835,46 +5003,49 @@
           <c:invertIfNegative val="0"/>
           <c:cat>
             <c:strRef>
-              <c:f>Sheet1!$A$405:$A$417</c:f>
+              <c:f>Sheet1!$A$405:$A$418</c:f>
               <c:strCache>
-                <c:ptCount val="13"/>
+                <c:ptCount val="14"/>
                 <c:pt idx="0">
+                  <c:v>Random Forest</c:v>
+                </c:pt>
+                <c:pt idx="1">
                   <c:v>J48-Pruned</c:v>
                 </c:pt>
-                <c:pt idx="1">
+                <c:pt idx="2">
                   <c:v>J48-Unpruned</c:v>
                 </c:pt>
-                <c:pt idx="2">
+                <c:pt idx="3">
                   <c:v>Naive Bayes</c:v>
                 </c:pt>
-                <c:pt idx="3">
+                <c:pt idx="4">
                   <c:v>Logistic Regression </c:v>
                 </c:pt>
-                <c:pt idx="4">
+                <c:pt idx="5">
                   <c:v>AdaBoost</c:v>
                 </c:pt>
-                <c:pt idx="5">
+                <c:pt idx="6">
                   <c:v>LogitBoost</c:v>
                 </c:pt>
-                <c:pt idx="6">
+                <c:pt idx="7">
                   <c:v>Bagging</c:v>
                 </c:pt>
-                <c:pt idx="7">
+                <c:pt idx="8">
                   <c:v>SVM c10k</c:v>
                 </c:pt>
-                <c:pt idx="8">
+                <c:pt idx="9">
                   <c:v>SVM c100k</c:v>
                 </c:pt>
-                <c:pt idx="9">
+                <c:pt idx="10">
                   <c:v>SVM c1000k</c:v>
                 </c:pt>
-                <c:pt idx="10">
+                <c:pt idx="11">
                   <c:v>1-NN</c:v>
                 </c:pt>
-                <c:pt idx="11">
+                <c:pt idx="12">
                   <c:v>3-NN</c:v>
                 </c:pt>
-                <c:pt idx="12">
+                <c:pt idx="13">
                   <c:v>5-NN</c:v>
                 </c:pt>
               </c:strCache>
@@ -4882,30 +5053,51 @@
           </c:cat>
           <c:val>
             <c:numRef>
-              <c:f>Sheet1!$C$405:$C$417</c:f>
+              <c:f>Sheet1!$C$405:$C$418</c:f>
               <c:numCache>
                 <c:formatCode>General</c:formatCode>
-                <c:ptCount val="13"/>
+                <c:ptCount val="14"/>
                 <c:pt idx="0">
+                  <c:v>0.98499999999999999</c:v>
+                </c:pt>
+                <c:pt idx="1">
                   <c:v>0.90400000000000003</c:v>
                 </c:pt>
-                <c:pt idx="1">
+                <c:pt idx="2">
                   <c:v>0.91200000000000003</c:v>
                 </c:pt>
-                <c:pt idx="2">
+                <c:pt idx="3">
                   <c:v>0.71599999999999997</c:v>
                 </c:pt>
-                <c:pt idx="3">
+                <c:pt idx="4">
                   <c:v>0.73399999999999999</c:v>
                 </c:pt>
-                <c:pt idx="4">
+                <c:pt idx="5">
                   <c:v>0.60099999999999998</c:v>
                 </c:pt>
-                <c:pt idx="5">
+                <c:pt idx="6">
                   <c:v>0.72</c:v>
                 </c:pt>
-                <c:pt idx="6">
+                <c:pt idx="7">
                   <c:v>0.98699999999999999</c:v>
+                </c:pt>
+                <c:pt idx="8">
+                  <c:v>0</c:v>
+                </c:pt>
+                <c:pt idx="9">
+                  <c:v>0</c:v>
+                </c:pt>
+                <c:pt idx="10">
+                  <c:v>0</c:v>
+                </c:pt>
+                <c:pt idx="11">
+                  <c:v>0.91100000000000003</c:v>
+                </c:pt>
+                <c:pt idx="12">
+                  <c:v>0.88200000000000001</c:v>
+                </c:pt>
+                <c:pt idx="13">
+                  <c:v>0.84599999999999997</c:v>
                 </c:pt>
               </c:numCache>
             </c:numRef>
@@ -4921,11 +5113,11 @@
         </c:dLbls>
         <c:gapWidth val="115"/>
         <c:overlap val="-20"/>
-        <c:axId val="901234048"/>
-        <c:axId val="901231328"/>
+        <c:axId val="-1863901312"/>
+        <c:axId val="-1863889888"/>
       </c:barChart>
       <c:catAx>
-        <c:axId val="901234048"/>
+        <c:axId val="-1863901312"/>
         <c:scaling>
           <c:orientation val="maxMin"/>
         </c:scaling>
@@ -4967,7 +5159,7 @@
             <a:endParaRPr lang="en-US"/>
           </a:p>
         </c:txPr>
-        <c:crossAx val="901231328"/>
+        <c:crossAx val="-1863889888"/>
         <c:crosses val="autoZero"/>
         <c:auto val="1"/>
         <c:lblAlgn val="ctr"/>
@@ -4975,7 +5167,7 @@
         <c:noMultiLvlLbl val="0"/>
       </c:catAx>
       <c:valAx>
-        <c:axId val="901231328"/>
+        <c:axId val="-1863889888"/>
         <c:scaling>
           <c:orientation val="minMax"/>
         </c:scaling>
@@ -5079,7 +5271,7 @@
             <a:endParaRPr lang="en-US"/>
           </a:p>
         </c:txPr>
-        <c:crossAx val="901234048"/>
+        <c:crossAx val="-1863901312"/>
         <c:crosses val="max"/>
         <c:crossBetween val="between"/>
       </c:valAx>
@@ -5235,6 +5427,7 @@
           </a:p>
         </c:rich>
       </c:tx>
+      <c:layout/>
       <c:overlay val="0"/>
       <c:spPr>
         <a:noFill/>
@@ -5549,11 +5742,11 @@
         </c:dLbls>
         <c:gapWidth val="115"/>
         <c:overlap val="-30"/>
-        <c:axId val="901234592"/>
-        <c:axId val="901238400"/>
+        <c:axId val="-1863899136"/>
+        <c:axId val="-1863898592"/>
       </c:barChart>
       <c:catAx>
-        <c:axId val="901234592"/>
+        <c:axId val="-1863899136"/>
         <c:scaling>
           <c:orientation val="minMax"/>
         </c:scaling>
@@ -5595,7 +5788,7 @@
             <a:endParaRPr lang="en-US"/>
           </a:p>
         </c:txPr>
-        <c:crossAx val="901238400"/>
+        <c:crossAx val="-1863898592"/>
         <c:crosses val="autoZero"/>
         <c:auto val="1"/>
         <c:lblAlgn val="ctr"/>
@@ -5603,7 +5796,7 @@
         <c:noMultiLvlLbl val="0"/>
       </c:catAx>
       <c:valAx>
-        <c:axId val="901238400"/>
+        <c:axId val="-1863898592"/>
         <c:scaling>
           <c:orientation val="minMax"/>
         </c:scaling>
@@ -5648,6 +5841,7 @@
               </a:p>
             </c:rich>
           </c:tx>
+          <c:layout/>
           <c:overlay val="0"/>
           <c:spPr>
             <a:noFill/>
@@ -5706,7 +5900,7 @@
             <a:endParaRPr lang="en-US"/>
           </a:p>
         </c:txPr>
-        <c:crossAx val="901234592"/>
+        <c:crossAx val="-1863899136"/>
         <c:crosses val="autoZero"/>
         <c:crossBetween val="between"/>
       </c:valAx>
@@ -5720,6 +5914,7 @@
     </c:plotArea>
     <c:legend>
       <c:legendPos val="t"/>
+      <c:layout/>
       <c:overlay val="0"/>
       <c:spPr>
         <a:noFill/>
@@ -5861,6 +6056,7 @@
           </a:p>
         </c:rich>
       </c:tx>
+      <c:layout/>
       <c:overlay val="0"/>
       <c:spPr>
         <a:noFill/>
@@ -6175,11 +6371,11 @@
         </c:dLbls>
         <c:gapWidth val="115"/>
         <c:overlap val="-30"/>
-        <c:axId val="901228064"/>
-        <c:axId val="901229152"/>
+        <c:axId val="-1863893696"/>
+        <c:axId val="-1863893152"/>
       </c:barChart>
       <c:catAx>
-        <c:axId val="901228064"/>
+        <c:axId val="-1863893696"/>
         <c:scaling>
           <c:orientation val="minMax"/>
         </c:scaling>
@@ -6221,7 +6417,7 @@
             <a:endParaRPr lang="en-US"/>
           </a:p>
         </c:txPr>
-        <c:crossAx val="901229152"/>
+        <c:crossAx val="-1863893152"/>
         <c:crosses val="autoZero"/>
         <c:auto val="1"/>
         <c:lblAlgn val="ctr"/>
@@ -6229,7 +6425,7 @@
         <c:noMultiLvlLbl val="0"/>
       </c:catAx>
       <c:valAx>
-        <c:axId val="901229152"/>
+        <c:axId val="-1863893152"/>
         <c:scaling>
           <c:orientation val="minMax"/>
         </c:scaling>
@@ -6274,6 +6470,7 @@
               </a:p>
             </c:rich>
           </c:tx>
+          <c:layout/>
           <c:overlay val="0"/>
           <c:spPr>
             <a:noFill/>
@@ -6332,7 +6529,7 @@
             <a:endParaRPr lang="en-US"/>
           </a:p>
         </c:txPr>
-        <c:crossAx val="901228064"/>
+        <c:crossAx val="-1863893696"/>
         <c:crosses val="autoZero"/>
         <c:crossBetween val="between"/>
       </c:valAx>
@@ -6346,6 +6543,7 @@
     </c:plotArea>
     <c:legend>
       <c:legendPos val="t"/>
+      <c:layout/>
       <c:overlay val="0"/>
       <c:spPr>
         <a:noFill/>
@@ -14791,7 +14989,7 @@
           <p:nvPr>
             <p:extLst>
               <p:ext uri="{D42A27DB-BD31-4B8C-83A1-F6EECF244321}">
-                <p14:modId xmlns:p14="http://schemas.microsoft.com/office/powerpoint/2010/main" val="1545938034"/>
+                <p14:modId xmlns:p14="http://schemas.microsoft.com/office/powerpoint/2010/main" val="891483870"/>
               </p:ext>
             </p:extLst>
           </p:nvPr>
@@ -14815,7 +15013,7 @@
           <p:nvPr>
             <p:extLst>
               <p:ext uri="{D42A27DB-BD31-4B8C-83A1-F6EECF244321}">
-                <p14:modId xmlns:p14="http://schemas.microsoft.com/office/powerpoint/2010/main" val="4053996462"/>
+                <p14:modId xmlns:p14="http://schemas.microsoft.com/office/powerpoint/2010/main" val="158066930"/>
               </p:ext>
             </p:extLst>
           </p:nvPr>
@@ -14839,7 +15037,7 @@
           <p:nvPr>
             <p:extLst>
               <p:ext uri="{D42A27DB-BD31-4B8C-83A1-F6EECF244321}">
-                <p14:modId xmlns:p14="http://schemas.microsoft.com/office/powerpoint/2010/main" val="385810028"/>
+                <p14:modId xmlns:p14="http://schemas.microsoft.com/office/powerpoint/2010/main" val="778849788"/>
               </p:ext>
             </p:extLst>
           </p:nvPr>
@@ -14931,7 +15129,7 @@
           <p:nvPr>
             <p:extLst>
               <p:ext uri="{D42A27DB-BD31-4B8C-83A1-F6EECF244321}">
-                <p14:modId xmlns:p14="http://schemas.microsoft.com/office/powerpoint/2010/main" val="729781424"/>
+                <p14:modId xmlns:p14="http://schemas.microsoft.com/office/powerpoint/2010/main" val="1943601879"/>
               </p:ext>
             </p:extLst>
           </p:nvPr>
@@ -14955,7 +15153,7 @@
           <p:nvPr>
             <p:extLst>
               <p:ext uri="{D42A27DB-BD31-4B8C-83A1-F6EECF244321}">
-                <p14:modId xmlns:p14="http://schemas.microsoft.com/office/powerpoint/2010/main" val="46233139"/>
+                <p14:modId xmlns:p14="http://schemas.microsoft.com/office/powerpoint/2010/main" val="2186499089"/>
               </p:ext>
             </p:extLst>
           </p:nvPr>
@@ -14979,7 +15177,7 @@
           <p:nvPr>
             <p:extLst>
               <p:ext uri="{D42A27DB-BD31-4B8C-83A1-F6EECF244321}">
-                <p14:modId xmlns:p14="http://schemas.microsoft.com/office/powerpoint/2010/main" val="2351815331"/>
+                <p14:modId xmlns:p14="http://schemas.microsoft.com/office/powerpoint/2010/main" val="3655263036"/>
               </p:ext>
             </p:extLst>
           </p:nvPr>

</xml_diff>

<commit_message>
Added SMOTE results for Dataset 4
</commit_message>
<xml_diff>
--- a/Documents/Presentation/Charts in slides.pptx
+++ b/Documents/Presentation/Charts in slides.pptx
@@ -408,11 +408,11 @@
           <c:showBubbleSize val="0"/>
         </c:dLbls>
         <c:smooth val="0"/>
-        <c:axId val="1277426688"/>
-        <c:axId val="1277434304"/>
+        <c:axId val="773488624"/>
+        <c:axId val="773489168"/>
       </c:lineChart>
       <c:catAx>
-        <c:axId val="1277426688"/>
+        <c:axId val="773488624"/>
         <c:scaling>
           <c:orientation val="minMax"/>
         </c:scaling>
@@ -556,7 +556,7 @@
             <a:endParaRPr lang="en-US"/>
           </a:p>
         </c:txPr>
-        <c:crossAx val="1277434304"/>
+        <c:crossAx val="773489168"/>
         <c:crosses val="autoZero"/>
         <c:auto val="1"/>
         <c:lblAlgn val="ctr"/>
@@ -564,7 +564,7 @@
         <c:noMultiLvlLbl val="0"/>
       </c:catAx>
       <c:valAx>
-        <c:axId val="1277434304"/>
+        <c:axId val="773489168"/>
         <c:scaling>
           <c:orientation val="minMax"/>
           <c:min val="50"/>
@@ -680,7 +680,7 @@
             <a:endParaRPr lang="en-US"/>
           </a:p>
         </c:txPr>
-        <c:crossAx val="1277426688"/>
+        <c:crossAx val="773488624"/>
         <c:crosses val="autoZero"/>
         <c:crossBetween val="midCat"/>
       </c:valAx>
@@ -828,6 +828,7 @@
           </a:p>
         </c:rich>
       </c:tx>
+      <c:layout/>
       <c:overlay val="0"/>
       <c:spPr>
         <a:noFill/>
@@ -1142,11 +1143,11 @@
         </c:dLbls>
         <c:gapWidth val="135"/>
         <c:overlap val="-30"/>
-        <c:axId val="1601043072"/>
-        <c:axId val="1601038720"/>
+        <c:axId val="1091096560"/>
+        <c:axId val="1090873280"/>
       </c:barChart>
       <c:catAx>
-        <c:axId val="1601043072"/>
+        <c:axId val="1091096560"/>
         <c:scaling>
           <c:orientation val="minMax"/>
         </c:scaling>
@@ -1188,7 +1189,7 @@
             <a:endParaRPr lang="en-US"/>
           </a:p>
         </c:txPr>
-        <c:crossAx val="1601038720"/>
+        <c:crossAx val="1090873280"/>
         <c:crosses val="autoZero"/>
         <c:auto val="1"/>
         <c:lblAlgn val="ctr"/>
@@ -1196,7 +1197,7 @@
         <c:noMultiLvlLbl val="0"/>
       </c:catAx>
       <c:valAx>
-        <c:axId val="1601038720"/>
+        <c:axId val="1090873280"/>
         <c:scaling>
           <c:orientation val="minMax"/>
         </c:scaling>
@@ -1241,6 +1242,7 @@
               </a:p>
             </c:rich>
           </c:tx>
+          <c:layout/>
           <c:overlay val="0"/>
           <c:spPr>
             <a:noFill/>
@@ -1299,7 +1301,7 @@
             <a:endParaRPr lang="en-US"/>
           </a:p>
         </c:txPr>
-        <c:crossAx val="1601043072"/>
+        <c:crossAx val="1091096560"/>
         <c:crosses val="autoZero"/>
         <c:crossBetween val="between"/>
       </c:valAx>
@@ -1313,6 +1315,7 @@
     </c:plotArea>
     <c:legend>
       <c:legendPos val="t"/>
+      <c:layout/>
       <c:overlay val="0"/>
       <c:spPr>
         <a:noFill/>
@@ -1485,7 +1488,7 @@
           <c:order val="0"/>
           <c:tx>
             <c:strRef>
-              <c:f>Sheet1!$B$236</c:f>
+              <c:f>Sheet1!$B$237</c:f>
               <c:strCache>
                 <c:ptCount val="1"/>
                 <c:pt idx="0">
@@ -1535,41 +1538,41 @@
           <c:invertIfNegative val="0"/>
           <c:cat>
             <c:strRef>
-              <c:f>Sheet1!$A$237:$A$250</c:f>
+              <c:f>Sheet1!$A$238:$A$251</c:f>
               <c:strCache>
                 <c:ptCount val="14"/>
                 <c:pt idx="0">
+                  <c:v>J48-Pruned</c:v>
+                </c:pt>
+                <c:pt idx="1">
+                  <c:v>J48-Unpruned</c:v>
+                </c:pt>
+                <c:pt idx="2">
+                  <c:v>Logistic Regression </c:v>
+                </c:pt>
+                <c:pt idx="3">
+                  <c:v>AdaBoost</c:v>
+                </c:pt>
+                <c:pt idx="4">
+                  <c:v>LogitBoost</c:v>
+                </c:pt>
+                <c:pt idx="5">
+                  <c:v>Bagging</c:v>
+                </c:pt>
+                <c:pt idx="6">
                   <c:v>Random Forest</c:v>
                 </c:pt>
-                <c:pt idx="1">
-                  <c:v>J48-Pruned</c:v>
-                </c:pt>
-                <c:pt idx="2">
-                  <c:v>J48-Unpruned</c:v>
-                </c:pt>
-                <c:pt idx="3">
+                <c:pt idx="7">
                   <c:v>Naive Bayes</c:v>
                 </c:pt>
-                <c:pt idx="4">
-                  <c:v>Logistic Regression </c:v>
-                </c:pt>
-                <c:pt idx="5">
-                  <c:v>AdaBoost</c:v>
-                </c:pt>
-                <c:pt idx="6">
-                  <c:v>LogitBoost</c:v>
-                </c:pt>
-                <c:pt idx="7">
-                  <c:v>Bagging</c:v>
-                </c:pt>
                 <c:pt idx="8">
-                  <c:v>SVM c10k</c:v>
+                  <c:v>SVM c1</c:v>
                 </c:pt>
                 <c:pt idx="9">
-                  <c:v>SVM c100k</c:v>
+                  <c:v>SVM c 0.1</c:v>
                 </c:pt>
                 <c:pt idx="10">
-                  <c:v>SVM c1000k</c:v>
+                  <c:v>SVM c 0.001</c:v>
                 </c:pt>
                 <c:pt idx="11">
                   <c:v>1-NN</c:v>
@@ -1585,42 +1588,42 @@
           </c:cat>
           <c:val>
             <c:numRef>
-              <c:f>Sheet1!$B$237:$B$250</c:f>
+              <c:f>Sheet1!$B$238:$B$251</c:f>
               <c:numCache>
                 <c:formatCode>General</c:formatCode>
                 <c:ptCount val="14"/>
                 <c:pt idx="0">
+                  <c:v>0.88100000000000001</c:v>
+                </c:pt>
+                <c:pt idx="1">
+                  <c:v>0.86</c:v>
+                </c:pt>
+                <c:pt idx="2">
+                  <c:v>0.874</c:v>
+                </c:pt>
+                <c:pt idx="3">
+                  <c:v>0.873</c:v>
+                </c:pt>
+                <c:pt idx="4">
+                  <c:v>0.873</c:v>
+                </c:pt>
+                <c:pt idx="5">
+                  <c:v>0.88</c:v>
+                </c:pt>
+                <c:pt idx="6">
                   <c:v>0.89800000000000002</c:v>
                 </c:pt>
-                <c:pt idx="1">
-                  <c:v>0.88100000000000001</c:v>
-                </c:pt>
-                <c:pt idx="2">
-                  <c:v>0.86</c:v>
-                </c:pt>
-                <c:pt idx="3">
+                <c:pt idx="7">
                   <c:v>0.81299999999999994</c:v>
                 </c:pt>
-                <c:pt idx="4">
-                  <c:v>0.874</c:v>
-                </c:pt>
-                <c:pt idx="5">
-                  <c:v>0.873</c:v>
-                </c:pt>
-                <c:pt idx="6">
-                  <c:v>0.873</c:v>
-                </c:pt>
-                <c:pt idx="7">
-                  <c:v>0.88</c:v>
-                </c:pt>
                 <c:pt idx="8">
-                  <c:v>0.73</c:v>
+                  <c:v>0.89</c:v>
                 </c:pt>
                 <c:pt idx="9">
-                  <c:v>0.87</c:v>
+                  <c:v>0.89</c:v>
                 </c:pt>
                 <c:pt idx="10">
-                  <c:v>0.88</c:v>
+                  <c:v>0.89</c:v>
                 </c:pt>
                 <c:pt idx="11">
                   <c:v>0.84</c:v>
@@ -1640,7 +1643,7 @@
           <c:order val="1"/>
           <c:tx>
             <c:strRef>
-              <c:f>Sheet1!$C$236</c:f>
+              <c:f>Sheet1!$C$237</c:f>
               <c:strCache>
                 <c:ptCount val="1"/>
                 <c:pt idx="0">
@@ -1690,41 +1693,41 @@
           <c:invertIfNegative val="0"/>
           <c:cat>
             <c:strRef>
-              <c:f>Sheet1!$A$237:$A$250</c:f>
+              <c:f>Sheet1!$A$238:$A$251</c:f>
               <c:strCache>
                 <c:ptCount val="14"/>
                 <c:pt idx="0">
+                  <c:v>J48-Pruned</c:v>
+                </c:pt>
+                <c:pt idx="1">
+                  <c:v>J48-Unpruned</c:v>
+                </c:pt>
+                <c:pt idx="2">
+                  <c:v>Logistic Regression </c:v>
+                </c:pt>
+                <c:pt idx="3">
+                  <c:v>AdaBoost</c:v>
+                </c:pt>
+                <c:pt idx="4">
+                  <c:v>LogitBoost</c:v>
+                </c:pt>
+                <c:pt idx="5">
+                  <c:v>Bagging</c:v>
+                </c:pt>
+                <c:pt idx="6">
                   <c:v>Random Forest</c:v>
                 </c:pt>
-                <c:pt idx="1">
-                  <c:v>J48-Pruned</c:v>
-                </c:pt>
-                <c:pt idx="2">
-                  <c:v>J48-Unpruned</c:v>
-                </c:pt>
-                <c:pt idx="3">
+                <c:pt idx="7">
                   <c:v>Naive Bayes</c:v>
                 </c:pt>
-                <c:pt idx="4">
-                  <c:v>Logistic Regression </c:v>
-                </c:pt>
-                <c:pt idx="5">
-                  <c:v>AdaBoost</c:v>
-                </c:pt>
-                <c:pt idx="6">
-                  <c:v>LogitBoost</c:v>
-                </c:pt>
-                <c:pt idx="7">
-                  <c:v>Bagging</c:v>
-                </c:pt>
                 <c:pt idx="8">
-                  <c:v>SVM c10k</c:v>
+                  <c:v>SVM c1</c:v>
                 </c:pt>
                 <c:pt idx="9">
-                  <c:v>SVM c100k</c:v>
+                  <c:v>SVM c 0.1</c:v>
                 </c:pt>
                 <c:pt idx="10">
-                  <c:v>SVM c1000k</c:v>
+                  <c:v>SVM c 0.001</c:v>
                 </c:pt>
                 <c:pt idx="11">
                   <c:v>1-NN</c:v>
@@ -1740,42 +1743,42 @@
           </c:cat>
           <c:val>
             <c:numRef>
-              <c:f>Sheet1!$C$237:$C$250</c:f>
+              <c:f>Sheet1!$C$238:$C$251</c:f>
               <c:numCache>
                 <c:formatCode>0.000</c:formatCode>
                 <c:ptCount val="14"/>
-                <c:pt idx="0" formatCode="General">
+                <c:pt idx="0">
+                  <c:v>0.85499999999999998</c:v>
+                </c:pt>
+                <c:pt idx="1">
+                  <c:v>0.86120000000000008</c:v>
+                </c:pt>
+                <c:pt idx="2">
+                  <c:v>0.83660000000000001</c:v>
+                </c:pt>
+                <c:pt idx="3">
+                  <c:v>0.79</c:v>
+                </c:pt>
+                <c:pt idx="4">
+                  <c:v>0.80709999999999993</c:v>
+                </c:pt>
+                <c:pt idx="5">
+                  <c:v>0.87769999999999992</c:v>
+                </c:pt>
+                <c:pt idx="6" formatCode="General">
                   <c:v>0.95</c:v>
                 </c:pt>
-                <c:pt idx="1">
-                  <c:v>0.85499999999999998</c:v>
-                </c:pt>
-                <c:pt idx="2">
-                  <c:v>0.86120000000000008</c:v>
-                </c:pt>
-                <c:pt idx="3">
+                <c:pt idx="7">
                   <c:v>0.70840000000000003</c:v>
                 </c:pt>
-                <c:pt idx="4">
-                  <c:v>0.83660000000000001</c:v>
-                </c:pt>
-                <c:pt idx="5">
-                  <c:v>0.79</c:v>
-                </c:pt>
-                <c:pt idx="6">
-                  <c:v>0.80709999999999993</c:v>
-                </c:pt>
-                <c:pt idx="7">
-                  <c:v>0.87769999999999992</c:v>
-                </c:pt>
                 <c:pt idx="8" formatCode="General">
-                  <c:v>0.39</c:v>
+                  <c:v>0.88</c:v>
                 </c:pt>
                 <c:pt idx="9" formatCode="General">
-                  <c:v>0.54</c:v>
+                  <c:v>0.88</c:v>
                 </c:pt>
                 <c:pt idx="10" formatCode="General">
-                  <c:v>0.62</c:v>
+                  <c:v>0.88</c:v>
                 </c:pt>
                 <c:pt idx="11" formatCode="General">
                   <c:v>0.89400000000000002</c:v>
@@ -1795,7 +1798,7 @@
           <c:order val="2"/>
           <c:tx>
             <c:strRef>
-              <c:f>Sheet1!$D$236</c:f>
+              <c:f>Sheet1!$D$237</c:f>
               <c:strCache>
                 <c:ptCount val="1"/>
                 <c:pt idx="0">
@@ -1845,41 +1848,41 @@
           <c:invertIfNegative val="0"/>
           <c:cat>
             <c:strRef>
-              <c:f>Sheet1!$A$237:$A$250</c:f>
+              <c:f>Sheet1!$A$238:$A$251</c:f>
               <c:strCache>
                 <c:ptCount val="14"/>
                 <c:pt idx="0">
+                  <c:v>J48-Pruned</c:v>
+                </c:pt>
+                <c:pt idx="1">
+                  <c:v>J48-Unpruned</c:v>
+                </c:pt>
+                <c:pt idx="2">
+                  <c:v>Logistic Regression </c:v>
+                </c:pt>
+                <c:pt idx="3">
+                  <c:v>AdaBoost</c:v>
+                </c:pt>
+                <c:pt idx="4">
+                  <c:v>LogitBoost</c:v>
+                </c:pt>
+                <c:pt idx="5">
+                  <c:v>Bagging</c:v>
+                </c:pt>
+                <c:pt idx="6">
                   <c:v>Random Forest</c:v>
                 </c:pt>
-                <c:pt idx="1">
-                  <c:v>J48-Pruned</c:v>
-                </c:pt>
-                <c:pt idx="2">
-                  <c:v>J48-Unpruned</c:v>
-                </c:pt>
-                <c:pt idx="3">
+                <c:pt idx="7">
                   <c:v>Naive Bayes</c:v>
                 </c:pt>
-                <c:pt idx="4">
-                  <c:v>Logistic Regression </c:v>
-                </c:pt>
-                <c:pt idx="5">
-                  <c:v>AdaBoost</c:v>
-                </c:pt>
-                <c:pt idx="6">
-                  <c:v>LogitBoost</c:v>
-                </c:pt>
-                <c:pt idx="7">
-                  <c:v>Bagging</c:v>
-                </c:pt>
                 <c:pt idx="8">
-                  <c:v>SVM c10k</c:v>
+                  <c:v>SVM c1</c:v>
                 </c:pt>
                 <c:pt idx="9">
-                  <c:v>SVM c100k</c:v>
+                  <c:v>SVM c 0.1</c:v>
                 </c:pt>
                 <c:pt idx="10">
-                  <c:v>SVM c1000k</c:v>
+                  <c:v>SVM c 0.001</c:v>
                 </c:pt>
                 <c:pt idx="11">
                   <c:v>1-NN</c:v>
@@ -1895,12 +1898,27 @@
           </c:cat>
           <c:val>
             <c:numRef>
-              <c:f>Sheet1!$D$237:$D$250</c:f>
+              <c:f>Sheet1!$D$238:$D$251</c:f>
               <c:numCache>
                 <c:formatCode>General</c:formatCode>
                 <c:ptCount val="14"/>
+                <c:pt idx="0">
+                  <c:v>0.81415400000000004</c:v>
+                </c:pt>
+                <c:pt idx="1">
+                  <c:v>0.83048599999999995</c:v>
+                </c:pt>
+                <c:pt idx="2">
+                  <c:v>0.77604700000000004</c:v>
+                </c:pt>
+                <c:pt idx="3">
+                  <c:v>0.61699999999999999</c:v>
+                </c:pt>
                 <c:pt idx="4">
-                  <c:v>0.76</c:v>
+                  <c:v>0.75558499999999995</c:v>
+                </c:pt>
+                <c:pt idx="5">
+                  <c:v>0.81899999999999995</c:v>
                 </c:pt>
               </c:numCache>
             </c:numRef>
@@ -1916,11 +1934,11 @@
         </c:dLbls>
         <c:gapWidth val="115"/>
         <c:overlap val="-20"/>
-        <c:axId val="1277437568"/>
-        <c:axId val="1277422336"/>
+        <c:axId val="773563040"/>
+        <c:axId val="773566304"/>
       </c:barChart>
       <c:catAx>
-        <c:axId val="1277437568"/>
+        <c:axId val="773563040"/>
         <c:scaling>
           <c:orientation val="maxMin"/>
         </c:scaling>
@@ -1962,7 +1980,7 @@
             <a:endParaRPr lang="en-US"/>
           </a:p>
         </c:txPr>
-        <c:crossAx val="1277422336"/>
+        <c:crossAx val="773566304"/>
         <c:crosses val="autoZero"/>
         <c:auto val="1"/>
         <c:lblAlgn val="ctr"/>
@@ -1970,7 +1988,7 @@
         <c:noMultiLvlLbl val="0"/>
       </c:catAx>
       <c:valAx>
-        <c:axId val="1277422336"/>
+        <c:axId val="773566304"/>
         <c:scaling>
           <c:orientation val="minMax"/>
         </c:scaling>
@@ -2074,7 +2092,7 @@
             <a:endParaRPr lang="en-US"/>
           </a:p>
         </c:txPr>
-        <c:crossAx val="1277437568"/>
+        <c:crossAx val="773563040"/>
         <c:crosses val="max"/>
         <c:crossBetween val="between"/>
       </c:valAx>
@@ -2266,7 +2284,7 @@
           <c:order val="0"/>
           <c:tx>
             <c:strRef>
-              <c:f>Sheet1!$B$267</c:f>
+              <c:f>Sheet1!$B$265</c:f>
               <c:strCache>
                 <c:ptCount val="1"/>
                 <c:pt idx="0">
@@ -2316,41 +2334,41 @@
           <c:invertIfNegative val="0"/>
           <c:cat>
             <c:strRef>
-              <c:f>Sheet1!$A$268:$A$281</c:f>
+              <c:f>Sheet1!$A$266:$A$279</c:f>
               <c:strCache>
                 <c:ptCount val="14"/>
                 <c:pt idx="0">
+                  <c:v>J48-Pruned</c:v>
+                </c:pt>
+                <c:pt idx="1">
+                  <c:v>J48-Unpruned</c:v>
+                </c:pt>
+                <c:pt idx="2">
+                  <c:v>Logistic Regression </c:v>
+                </c:pt>
+                <c:pt idx="3">
+                  <c:v>AdaBoost</c:v>
+                </c:pt>
+                <c:pt idx="4">
+                  <c:v>LogitBoost</c:v>
+                </c:pt>
+                <c:pt idx="5">
+                  <c:v>Bagging</c:v>
+                </c:pt>
+                <c:pt idx="6">
                   <c:v>Random Forest</c:v>
                 </c:pt>
-                <c:pt idx="1">
-                  <c:v>J48-Pruned</c:v>
-                </c:pt>
-                <c:pt idx="2">
-                  <c:v>J48-Unpruned</c:v>
-                </c:pt>
-                <c:pt idx="3">
+                <c:pt idx="7">
                   <c:v>Naive Bayes</c:v>
                 </c:pt>
-                <c:pt idx="4">
-                  <c:v>Logistic Regression </c:v>
-                </c:pt>
-                <c:pt idx="5">
-                  <c:v>AdaBoost</c:v>
-                </c:pt>
-                <c:pt idx="6">
-                  <c:v>LogitBoost</c:v>
-                </c:pt>
-                <c:pt idx="7">
-                  <c:v>Bagging</c:v>
-                </c:pt>
                 <c:pt idx="8">
-                  <c:v>SVM c10k</c:v>
+                  <c:v>SVM c1</c:v>
                 </c:pt>
                 <c:pt idx="9">
-                  <c:v>SVM c100k</c:v>
+                  <c:v>SVM c 0.1</c:v>
                 </c:pt>
                 <c:pt idx="10">
-                  <c:v>SVM c1000k</c:v>
+                  <c:v>SVM c 0.001</c:v>
                 </c:pt>
                 <c:pt idx="11">
                   <c:v>1-NN</c:v>
@@ -2366,42 +2384,42 @@
           </c:cat>
           <c:val>
             <c:numRef>
-              <c:f>Sheet1!$B$268:$B$281</c:f>
+              <c:f>Sheet1!$B$266:$B$279</c:f>
               <c:numCache>
                 <c:formatCode>0.000</c:formatCode>
                 <c:ptCount val="14"/>
-                <c:pt idx="0" formatCode="General">
+                <c:pt idx="0">
+                  <c:v>0.90538799999999997</c:v>
+                </c:pt>
+                <c:pt idx="1">
+                  <c:v>0.86765499999999995</c:v>
+                </c:pt>
+                <c:pt idx="2">
+                  <c:v>0.89562600000000003</c:v>
+                </c:pt>
+                <c:pt idx="3">
+                  <c:v>0.89299799999999996</c:v>
+                </c:pt>
+                <c:pt idx="4">
+                  <c:v>0.89400000000000002</c:v>
+                </c:pt>
+                <c:pt idx="5">
+                  <c:v>0.90407400000000004</c:v>
+                </c:pt>
+                <c:pt idx="6" formatCode="General">
                   <c:v>0.876</c:v>
                 </c:pt>
-                <c:pt idx="1">
-                  <c:v>0.90538799999999997</c:v>
-                </c:pt>
-                <c:pt idx="2">
-                  <c:v>0.86765499999999995</c:v>
-                </c:pt>
-                <c:pt idx="3">
+                <c:pt idx="7">
                   <c:v>0.79294200000000004</c:v>
                 </c:pt>
-                <c:pt idx="4">
-                  <c:v>0.89562600000000003</c:v>
-                </c:pt>
-                <c:pt idx="5">
-                  <c:v>0.89299799999999996</c:v>
-                </c:pt>
-                <c:pt idx="6">
-                  <c:v>0.89400000000000002</c:v>
-                </c:pt>
-                <c:pt idx="7">
-                  <c:v>0.90407400000000004</c:v>
-                </c:pt>
                 <c:pt idx="8" formatCode="General">
-                  <c:v>0.24</c:v>
+                  <c:v>0.87</c:v>
                 </c:pt>
                 <c:pt idx="9" formatCode="General">
-                  <c:v>2E-3</c:v>
+                  <c:v>0.87</c:v>
                 </c:pt>
                 <c:pt idx="10" formatCode="General">
-                  <c:v>0.17</c:v>
+                  <c:v>0.86</c:v>
                 </c:pt>
                 <c:pt idx="11" formatCode="General">
                   <c:v>0.84</c:v>
@@ -2421,7 +2439,7 @@
           <c:order val="1"/>
           <c:tx>
             <c:strRef>
-              <c:f>Sheet1!$C$267</c:f>
+              <c:f>Sheet1!$C$265</c:f>
               <c:strCache>
                 <c:ptCount val="1"/>
                 <c:pt idx="0">
@@ -2471,41 +2489,41 @@
           <c:invertIfNegative val="0"/>
           <c:cat>
             <c:strRef>
-              <c:f>Sheet1!$A$268:$A$281</c:f>
+              <c:f>Sheet1!$A$266:$A$279</c:f>
               <c:strCache>
                 <c:ptCount val="14"/>
                 <c:pt idx="0">
+                  <c:v>J48-Pruned</c:v>
+                </c:pt>
+                <c:pt idx="1">
+                  <c:v>J48-Unpruned</c:v>
+                </c:pt>
+                <c:pt idx="2">
+                  <c:v>Logistic Regression </c:v>
+                </c:pt>
+                <c:pt idx="3">
+                  <c:v>AdaBoost</c:v>
+                </c:pt>
+                <c:pt idx="4">
+                  <c:v>LogitBoost</c:v>
+                </c:pt>
+                <c:pt idx="5">
+                  <c:v>Bagging</c:v>
+                </c:pt>
+                <c:pt idx="6">
                   <c:v>Random Forest</c:v>
                 </c:pt>
-                <c:pt idx="1">
-                  <c:v>J48-Pruned</c:v>
-                </c:pt>
-                <c:pt idx="2">
-                  <c:v>J48-Unpruned</c:v>
-                </c:pt>
-                <c:pt idx="3">
+                <c:pt idx="7">
                   <c:v>Naive Bayes</c:v>
                 </c:pt>
-                <c:pt idx="4">
-                  <c:v>Logistic Regression </c:v>
-                </c:pt>
-                <c:pt idx="5">
-                  <c:v>AdaBoost</c:v>
-                </c:pt>
-                <c:pt idx="6">
-                  <c:v>LogitBoost</c:v>
-                </c:pt>
-                <c:pt idx="7">
-                  <c:v>Bagging</c:v>
-                </c:pt>
                 <c:pt idx="8">
-                  <c:v>SVM c10k</c:v>
+                  <c:v>SVM c1</c:v>
                 </c:pt>
                 <c:pt idx="9">
-                  <c:v>SVM c100k</c:v>
+                  <c:v>SVM c 0.1</c:v>
                 </c:pt>
                 <c:pt idx="10">
-                  <c:v>SVM c1000k</c:v>
+                  <c:v>SVM c 0.001</c:v>
                 </c:pt>
                 <c:pt idx="11">
                   <c:v>1-NN</c:v>
@@ -2521,42 +2539,42 @@
           </c:cat>
           <c:val>
             <c:numRef>
-              <c:f>Sheet1!$C$268:$C$281</c:f>
+              <c:f>Sheet1!$C$266:$C$279</c:f>
               <c:numCache>
                 <c:formatCode>General</c:formatCode>
                 <c:ptCount val="14"/>
                 <c:pt idx="0">
+                  <c:v>0.874</c:v>
+                </c:pt>
+                <c:pt idx="1">
+                  <c:v>0.879</c:v>
+                </c:pt>
+                <c:pt idx="2">
+                  <c:v>0.84099999999999997</c:v>
+                </c:pt>
+                <c:pt idx="3">
+                  <c:v>0.81</c:v>
+                </c:pt>
+                <c:pt idx="4">
+                  <c:v>0.82099999999999995</c:v>
+                </c:pt>
+                <c:pt idx="5">
+                  <c:v>0.89</c:v>
+                </c:pt>
+                <c:pt idx="6">
                   <c:v>0.95299999999999996</c:v>
                 </c:pt>
-                <c:pt idx="1">
-                  <c:v>0.874</c:v>
-                </c:pt>
-                <c:pt idx="2">
-                  <c:v>0.879</c:v>
-                </c:pt>
-                <c:pt idx="3">
+                <c:pt idx="7">
                   <c:v>0.753</c:v>
                 </c:pt>
-                <c:pt idx="4">
-                  <c:v>0.84099999999999997</c:v>
-                </c:pt>
-                <c:pt idx="5">
-                  <c:v>0.81</c:v>
-                </c:pt>
-                <c:pt idx="6">
-                  <c:v>0.82099999999999995</c:v>
-                </c:pt>
-                <c:pt idx="7">
-                  <c:v>0.89</c:v>
-                </c:pt>
                 <c:pt idx="8">
-                  <c:v>0.56000000000000005</c:v>
+                  <c:v>0.86</c:v>
                 </c:pt>
                 <c:pt idx="9">
-                  <c:v>0.49</c:v>
+                  <c:v>0.86</c:v>
                 </c:pt>
                 <c:pt idx="10">
-                  <c:v>0.49</c:v>
+                  <c:v>0.86</c:v>
                 </c:pt>
                 <c:pt idx="11">
                   <c:v>0.9</c:v>
@@ -2566,6 +2584,137 @@
                 </c:pt>
                 <c:pt idx="13">
                   <c:v>0.76600000000000001</c:v>
+                </c:pt>
+              </c:numCache>
+            </c:numRef>
+          </c:val>
+        </c:ser>
+        <c:ser>
+          <c:idx val="2"/>
+          <c:order val="2"/>
+          <c:tx>
+            <c:strRef>
+              <c:f>Sheet1!$D$265</c:f>
+              <c:strCache>
+                <c:ptCount val="1"/>
+                <c:pt idx="0">
+                  <c:v>Balanced Dataset (SMOTE)</c:v>
+                </c:pt>
+              </c:strCache>
+            </c:strRef>
+          </c:tx>
+          <c:spPr>
+            <a:gradFill rotWithShape="1">
+              <a:gsLst>
+                <a:gs pos="0">
+                  <a:schemeClr val="accent3">
+                    <a:satMod val="103000"/>
+                    <a:lumMod val="102000"/>
+                    <a:tint val="94000"/>
+                  </a:schemeClr>
+                </a:gs>
+                <a:gs pos="50000">
+                  <a:schemeClr val="accent3">
+                    <a:satMod val="110000"/>
+                    <a:lumMod val="100000"/>
+                    <a:shade val="100000"/>
+                  </a:schemeClr>
+                </a:gs>
+                <a:gs pos="100000">
+                  <a:schemeClr val="accent3">
+                    <a:lumMod val="99000"/>
+                    <a:satMod val="120000"/>
+                    <a:shade val="78000"/>
+                  </a:schemeClr>
+                </a:gs>
+              </a:gsLst>
+              <a:lin ang="5400000" scaled="0"/>
+            </a:gradFill>
+            <a:ln>
+              <a:noFill/>
+            </a:ln>
+            <a:effectLst>
+              <a:outerShdw blurRad="57150" dist="19050" dir="5400000" algn="ctr" rotWithShape="0">
+                <a:srgbClr val="000000">
+                  <a:alpha val="63000"/>
+                </a:srgbClr>
+              </a:outerShdw>
+            </a:effectLst>
+          </c:spPr>
+          <c:invertIfNegative val="0"/>
+          <c:cat>
+            <c:strRef>
+              <c:f>Sheet1!$A$266:$A$279</c:f>
+              <c:strCache>
+                <c:ptCount val="14"/>
+                <c:pt idx="0">
+                  <c:v>J48-Pruned</c:v>
+                </c:pt>
+                <c:pt idx="1">
+                  <c:v>J48-Unpruned</c:v>
+                </c:pt>
+                <c:pt idx="2">
+                  <c:v>Logistic Regression </c:v>
+                </c:pt>
+                <c:pt idx="3">
+                  <c:v>AdaBoost</c:v>
+                </c:pt>
+                <c:pt idx="4">
+                  <c:v>LogitBoost</c:v>
+                </c:pt>
+                <c:pt idx="5">
+                  <c:v>Bagging</c:v>
+                </c:pt>
+                <c:pt idx="6">
+                  <c:v>Random Forest</c:v>
+                </c:pt>
+                <c:pt idx="7">
+                  <c:v>Naive Bayes</c:v>
+                </c:pt>
+                <c:pt idx="8">
+                  <c:v>SVM c1</c:v>
+                </c:pt>
+                <c:pt idx="9">
+                  <c:v>SVM c 0.1</c:v>
+                </c:pt>
+                <c:pt idx="10">
+                  <c:v>SVM c 0.001</c:v>
+                </c:pt>
+                <c:pt idx="11">
+                  <c:v>1-NN</c:v>
+                </c:pt>
+                <c:pt idx="12">
+                  <c:v>3-NN</c:v>
+                </c:pt>
+                <c:pt idx="13">
+                  <c:v>5-NN</c:v>
+                </c:pt>
+              </c:strCache>
+            </c:strRef>
+          </c:cat>
+          <c:val>
+            <c:numRef>
+              <c:f>Sheet1!$D$266:$D$279</c:f>
+              <c:numCache>
+                <c:formatCode>General</c:formatCode>
+                <c:ptCount val="14"/>
+                <c:pt idx="0">
+                  <c:v>0.82699999999999996</c:v>
+                </c:pt>
+                <c:pt idx="1">
+                  <c:v>0.83799999999999997</c:v>
+                </c:pt>
+                <c:pt idx="2">
+                  <c:v>0.80500000000000005</c:v>
+                </c:pt>
+                <c:pt idx="3">
+                  <c:v>0.68799999999999994</c:v>
+                </c:pt>
+                <c:pt idx="4">
+                  <c:v>0.79100000000000004</c:v>
+                </c:pt>
+                <c:pt idx="5">
+                  <c:v>0.83199999999999996</c:v>
                 </c:pt>
               </c:numCache>
             </c:numRef>
@@ -2581,11 +2730,11 @@
         </c:dLbls>
         <c:gapWidth val="115"/>
         <c:overlap val="-20"/>
-        <c:axId val="1277217488"/>
-        <c:axId val="1277219120"/>
+        <c:axId val="1091082960"/>
+        <c:axId val="1091084048"/>
       </c:barChart>
       <c:catAx>
-        <c:axId val="1277217488"/>
+        <c:axId val="1091082960"/>
         <c:scaling>
           <c:orientation val="maxMin"/>
         </c:scaling>
@@ -2627,7 +2776,7 @@
             <a:endParaRPr lang="en-US"/>
           </a:p>
         </c:txPr>
-        <c:crossAx val="1277219120"/>
+        <c:crossAx val="1091084048"/>
         <c:crosses val="autoZero"/>
         <c:auto val="1"/>
         <c:lblAlgn val="ctr"/>
@@ -2635,7 +2784,7 @@
         <c:noMultiLvlLbl val="0"/>
       </c:catAx>
       <c:valAx>
-        <c:axId val="1277219120"/>
+        <c:axId val="1091084048"/>
         <c:scaling>
           <c:orientation val="minMax"/>
         </c:scaling>
@@ -2739,7 +2888,7 @@
             <a:endParaRPr lang="en-US"/>
           </a:p>
         </c:txPr>
-        <c:crossAx val="1277217488"/>
+        <c:crossAx val="1091082960"/>
         <c:crosses val="max"/>
         <c:crossBetween val="between"/>
       </c:valAx>
@@ -2985,37 +3134,37 @@
               <c:strCache>
                 <c:ptCount val="14"/>
                 <c:pt idx="0">
+                  <c:v>J48-Pruned</c:v>
+                </c:pt>
+                <c:pt idx="1">
+                  <c:v>J48-Unpruned</c:v>
+                </c:pt>
+                <c:pt idx="2">
+                  <c:v>Logistic Regression </c:v>
+                </c:pt>
+                <c:pt idx="3">
+                  <c:v>AdaBoost</c:v>
+                </c:pt>
+                <c:pt idx="4">
+                  <c:v>LogitBoost</c:v>
+                </c:pt>
+                <c:pt idx="5">
+                  <c:v>Bagging</c:v>
+                </c:pt>
+                <c:pt idx="6">
                   <c:v>Random Forest</c:v>
                 </c:pt>
-                <c:pt idx="1">
-                  <c:v>J48-Pruned</c:v>
-                </c:pt>
-                <c:pt idx="2">
-                  <c:v>J48-Unpruned</c:v>
-                </c:pt>
-                <c:pt idx="3">
+                <c:pt idx="7">
                   <c:v>Naive Bayes</c:v>
                 </c:pt>
-                <c:pt idx="4">
-                  <c:v>Logistic Regression </c:v>
-                </c:pt>
-                <c:pt idx="5">
-                  <c:v>AdaBoost</c:v>
-                </c:pt>
-                <c:pt idx="6">
-                  <c:v>LogitBoost</c:v>
-                </c:pt>
-                <c:pt idx="7">
-                  <c:v>Bagging</c:v>
-                </c:pt>
                 <c:pt idx="8">
-                  <c:v>SVM c10k</c:v>
+                  <c:v>SVM c1</c:v>
                 </c:pt>
                 <c:pt idx="9">
-                  <c:v>SVM c100k</c:v>
+                  <c:v>SVM c 0.1</c:v>
                 </c:pt>
                 <c:pt idx="10">
-                  <c:v>SVM c1000k</c:v>
+                  <c:v>SVM c 0.001</c:v>
                 </c:pt>
                 <c:pt idx="11">
                   <c:v>1-NN</c:v>
@@ -3035,38 +3184,38 @@
               <c:numCache>
                 <c:formatCode>0.000</c:formatCode>
                 <c:ptCount val="14"/>
-                <c:pt idx="0" formatCode="General">
+                <c:pt idx="0">
+                  <c:v>0.90538799999999997</c:v>
+                </c:pt>
+                <c:pt idx="1">
+                  <c:v>0.86765499999999995</c:v>
+                </c:pt>
+                <c:pt idx="2">
+                  <c:v>0.89562600000000003</c:v>
+                </c:pt>
+                <c:pt idx="3">
+                  <c:v>0.89299799999999996</c:v>
+                </c:pt>
+                <c:pt idx="4">
+                  <c:v>0.89400000000000002</c:v>
+                </c:pt>
+                <c:pt idx="5">
+                  <c:v>0.90407400000000004</c:v>
+                </c:pt>
+                <c:pt idx="6" formatCode="General">
                   <c:v>0.68700000000000006</c:v>
                 </c:pt>
-                <c:pt idx="1">
-                  <c:v>0.90538799999999997</c:v>
-                </c:pt>
-                <c:pt idx="2">
-                  <c:v>0.86765499999999995</c:v>
-                </c:pt>
-                <c:pt idx="3">
+                <c:pt idx="7">
                   <c:v>0.79294200000000004</c:v>
                 </c:pt>
-                <c:pt idx="4">
-                  <c:v>0.89562600000000003</c:v>
-                </c:pt>
-                <c:pt idx="5">
-                  <c:v>0.89299799999999996</c:v>
-                </c:pt>
-                <c:pt idx="6">
-                  <c:v>0.89400000000000002</c:v>
-                </c:pt>
-                <c:pt idx="7">
-                  <c:v>0.90407400000000004</c:v>
-                </c:pt>
                 <c:pt idx="8" formatCode="General">
-                  <c:v>0.67</c:v>
+                  <c:v>0.6</c:v>
                 </c:pt>
                 <c:pt idx="9" formatCode="General">
-                  <c:v>0.65</c:v>
+                  <c:v>0.6</c:v>
                 </c:pt>
                 <c:pt idx="10" formatCode="General">
-                  <c:v>0.63</c:v>
+                  <c:v>0.6</c:v>
                 </c:pt>
                 <c:pt idx="11" formatCode="General">
                   <c:v>0.60099999999999998</c:v>
@@ -3140,37 +3289,37 @@
               <c:strCache>
                 <c:ptCount val="14"/>
                 <c:pt idx="0">
+                  <c:v>J48-Pruned</c:v>
+                </c:pt>
+                <c:pt idx="1">
+                  <c:v>J48-Unpruned</c:v>
+                </c:pt>
+                <c:pt idx="2">
+                  <c:v>Logistic Regression </c:v>
+                </c:pt>
+                <c:pt idx="3">
+                  <c:v>AdaBoost</c:v>
+                </c:pt>
+                <c:pt idx="4">
+                  <c:v>LogitBoost</c:v>
+                </c:pt>
+                <c:pt idx="5">
+                  <c:v>Bagging</c:v>
+                </c:pt>
+                <c:pt idx="6">
                   <c:v>Random Forest</c:v>
                 </c:pt>
-                <c:pt idx="1">
-                  <c:v>J48-Pruned</c:v>
-                </c:pt>
-                <c:pt idx="2">
-                  <c:v>J48-Unpruned</c:v>
-                </c:pt>
-                <c:pt idx="3">
+                <c:pt idx="7">
                   <c:v>Naive Bayes</c:v>
                 </c:pt>
-                <c:pt idx="4">
-                  <c:v>Logistic Regression </c:v>
-                </c:pt>
-                <c:pt idx="5">
-                  <c:v>AdaBoost</c:v>
-                </c:pt>
-                <c:pt idx="6">
-                  <c:v>LogitBoost</c:v>
-                </c:pt>
-                <c:pt idx="7">
-                  <c:v>Bagging</c:v>
-                </c:pt>
                 <c:pt idx="8">
-                  <c:v>SVM c10k</c:v>
+                  <c:v>SVM c1</c:v>
                 </c:pt>
                 <c:pt idx="9">
-                  <c:v>SVM c100k</c:v>
+                  <c:v>SVM c 0.1</c:v>
                 </c:pt>
                 <c:pt idx="10">
-                  <c:v>SVM c1000k</c:v>
+                  <c:v>SVM c 0.001</c:v>
                 </c:pt>
                 <c:pt idx="11">
                   <c:v>1-NN</c:v>
@@ -3190,38 +3339,38 @@
               <c:numCache>
                 <c:formatCode>0.000</c:formatCode>
                 <c:ptCount val="14"/>
-                <c:pt idx="0" formatCode="General">
+                <c:pt idx="0">
+                  <c:v>0.85499999999999998</c:v>
+                </c:pt>
+                <c:pt idx="1">
+                  <c:v>0.86120000000000008</c:v>
+                </c:pt>
+                <c:pt idx="2">
+                  <c:v>0.83660000000000001</c:v>
+                </c:pt>
+                <c:pt idx="3">
+                  <c:v>0.79</c:v>
+                </c:pt>
+                <c:pt idx="4">
+                  <c:v>0.80709999999999993</c:v>
+                </c:pt>
+                <c:pt idx="5">
+                  <c:v>0.87769999999999992</c:v>
+                </c:pt>
+                <c:pt idx="6" formatCode="General">
                   <c:v>0.99</c:v>
                 </c:pt>
-                <c:pt idx="1">
-                  <c:v>0.85499999999999998</c:v>
-                </c:pt>
-                <c:pt idx="2">
-                  <c:v>0.86120000000000008</c:v>
-                </c:pt>
-                <c:pt idx="3">
+                <c:pt idx="7">
                   <c:v>0.70840000000000003</c:v>
                 </c:pt>
-                <c:pt idx="4">
-                  <c:v>0.83660000000000001</c:v>
-                </c:pt>
-                <c:pt idx="5">
-                  <c:v>0.79</c:v>
-                </c:pt>
-                <c:pt idx="6">
-                  <c:v>0.80709999999999993</c:v>
-                </c:pt>
-                <c:pt idx="7">
-                  <c:v>0.87769999999999992</c:v>
-                </c:pt>
                 <c:pt idx="8" formatCode="General">
-                  <c:v>0.61</c:v>
+                  <c:v>0.6</c:v>
                 </c:pt>
                 <c:pt idx="9" formatCode="General">
-                  <c:v>0.59</c:v>
+                  <c:v>0.6</c:v>
                 </c:pt>
                 <c:pt idx="10" formatCode="General">
-                  <c:v>0.56999999999999995</c:v>
+                  <c:v>0.6</c:v>
                 </c:pt>
                 <c:pt idx="11" formatCode="General">
                   <c:v>0.91300000000000003</c:v>
@@ -3231,6 +3380,137 @@
                 </c:pt>
                 <c:pt idx="13" formatCode="General">
                   <c:v>0.84199999999999997</c:v>
+                </c:pt>
+              </c:numCache>
+            </c:numRef>
+          </c:val>
+        </c:ser>
+        <c:ser>
+          <c:idx val="2"/>
+          <c:order val="2"/>
+          <c:tx>
+            <c:strRef>
+              <c:f>Sheet1!$D$297</c:f>
+              <c:strCache>
+                <c:ptCount val="1"/>
+                <c:pt idx="0">
+                  <c:v>Balanced Dataset (SMOTE)</c:v>
+                </c:pt>
+              </c:strCache>
+            </c:strRef>
+          </c:tx>
+          <c:spPr>
+            <a:gradFill rotWithShape="1">
+              <a:gsLst>
+                <a:gs pos="0">
+                  <a:schemeClr val="accent3">
+                    <a:satMod val="103000"/>
+                    <a:lumMod val="102000"/>
+                    <a:tint val="94000"/>
+                  </a:schemeClr>
+                </a:gs>
+                <a:gs pos="50000">
+                  <a:schemeClr val="accent3">
+                    <a:satMod val="110000"/>
+                    <a:lumMod val="100000"/>
+                    <a:shade val="100000"/>
+                  </a:schemeClr>
+                </a:gs>
+                <a:gs pos="100000">
+                  <a:schemeClr val="accent3">
+                    <a:lumMod val="99000"/>
+                    <a:satMod val="120000"/>
+                    <a:shade val="78000"/>
+                  </a:schemeClr>
+                </a:gs>
+              </a:gsLst>
+              <a:lin ang="5400000" scaled="0"/>
+            </a:gradFill>
+            <a:ln>
+              <a:noFill/>
+            </a:ln>
+            <a:effectLst>
+              <a:outerShdw blurRad="57150" dist="19050" dir="5400000" algn="ctr" rotWithShape="0">
+                <a:srgbClr val="000000">
+                  <a:alpha val="63000"/>
+                </a:srgbClr>
+              </a:outerShdw>
+            </a:effectLst>
+          </c:spPr>
+          <c:invertIfNegative val="0"/>
+          <c:cat>
+            <c:strRef>
+              <c:f>Sheet1!$A$298:$A$311</c:f>
+              <c:strCache>
+                <c:ptCount val="14"/>
+                <c:pt idx="0">
+                  <c:v>J48-Pruned</c:v>
+                </c:pt>
+                <c:pt idx="1">
+                  <c:v>J48-Unpruned</c:v>
+                </c:pt>
+                <c:pt idx="2">
+                  <c:v>Logistic Regression </c:v>
+                </c:pt>
+                <c:pt idx="3">
+                  <c:v>AdaBoost</c:v>
+                </c:pt>
+                <c:pt idx="4">
+                  <c:v>LogitBoost</c:v>
+                </c:pt>
+                <c:pt idx="5">
+                  <c:v>Bagging</c:v>
+                </c:pt>
+                <c:pt idx="6">
+                  <c:v>Random Forest</c:v>
+                </c:pt>
+                <c:pt idx="7">
+                  <c:v>Naive Bayes</c:v>
+                </c:pt>
+                <c:pt idx="8">
+                  <c:v>SVM c1</c:v>
+                </c:pt>
+                <c:pt idx="9">
+                  <c:v>SVM c 0.1</c:v>
+                </c:pt>
+                <c:pt idx="10">
+                  <c:v>SVM c 0.001</c:v>
+                </c:pt>
+                <c:pt idx="11">
+                  <c:v>1-NN</c:v>
+                </c:pt>
+                <c:pt idx="12">
+                  <c:v>3-NN</c:v>
+                </c:pt>
+                <c:pt idx="13">
+                  <c:v>5-NN</c:v>
+                </c:pt>
+              </c:strCache>
+            </c:strRef>
+          </c:cat>
+          <c:val>
+            <c:numRef>
+              <c:f>Sheet1!$D$298:$D$311</c:f>
+              <c:numCache>
+                <c:formatCode>General</c:formatCode>
+                <c:ptCount val="14"/>
+                <c:pt idx="0">
+                  <c:v>0.65</c:v>
+                </c:pt>
+                <c:pt idx="1">
+                  <c:v>0.66300000000000003</c:v>
+                </c:pt>
+                <c:pt idx="2">
+                  <c:v>0.69199999999999995</c:v>
+                </c:pt>
+                <c:pt idx="3">
+                  <c:v>0.69899999999999995</c:v>
+                </c:pt>
+                <c:pt idx="4">
+                  <c:v>0.71099999999999997</c:v>
+                </c:pt>
+                <c:pt idx="5">
+                  <c:v>0.69599999999999995</c:v>
                 </c:pt>
               </c:numCache>
             </c:numRef>
@@ -3246,11 +3526,11 @@
         </c:dLbls>
         <c:gapWidth val="115"/>
         <c:overlap val="-20"/>
-        <c:axId val="1601039264"/>
-        <c:axId val="1601047424"/>
+        <c:axId val="1091091664"/>
+        <c:axId val="1091088944"/>
       </c:barChart>
       <c:catAx>
-        <c:axId val="1601039264"/>
+        <c:axId val="1091091664"/>
         <c:scaling>
           <c:orientation val="maxMin"/>
         </c:scaling>
@@ -3292,7 +3572,7 @@
             <a:endParaRPr lang="en-US"/>
           </a:p>
         </c:txPr>
-        <c:crossAx val="1601047424"/>
+        <c:crossAx val="1091088944"/>
         <c:crosses val="autoZero"/>
         <c:auto val="1"/>
         <c:lblAlgn val="ctr"/>
@@ -3300,7 +3580,7 @@
         <c:noMultiLvlLbl val="0"/>
       </c:catAx>
       <c:valAx>
-        <c:axId val="1601047424"/>
+        <c:axId val="1091088944"/>
         <c:scaling>
           <c:orientation val="minMax"/>
         </c:scaling>
@@ -3404,7 +3684,7 @@
             <a:endParaRPr lang="en-US"/>
           </a:p>
         </c:txPr>
-        <c:crossAx val="1601039264"/>
+        <c:crossAx val="1091091664"/>
         <c:crosses val="max"/>
         <c:crossBetween val="between"/>
       </c:valAx>
@@ -3669,13 +3949,13 @@
                   <c:v>Bagging</c:v>
                 </c:pt>
                 <c:pt idx="8">
-                  <c:v>SVM c10k</c:v>
+                  <c:v>SVM c1</c:v>
                 </c:pt>
                 <c:pt idx="9">
-                  <c:v>SVM c100k</c:v>
+                  <c:v>SVM c 0.1</c:v>
                 </c:pt>
                 <c:pt idx="10">
-                  <c:v>SVM c1000k</c:v>
+                  <c:v>SVM c 0.001</c:v>
                 </c:pt>
                 <c:pt idx="11">
                   <c:v>1-NN</c:v>
@@ -3720,13 +4000,13 @@
                   <c:v>0.90100000000000002</c:v>
                 </c:pt>
                 <c:pt idx="8">
-                  <c:v>0</c:v>
+                  <c:v>0.89200000000000002</c:v>
                 </c:pt>
                 <c:pt idx="9">
-                  <c:v>0</c:v>
+                  <c:v>0.88</c:v>
                 </c:pt>
                 <c:pt idx="10">
-                  <c:v>0</c:v>
+                  <c:v>0.89</c:v>
                 </c:pt>
                 <c:pt idx="11">
                   <c:v>0.82699999999999996</c:v>
@@ -3824,13 +4104,13 @@
                   <c:v>Bagging</c:v>
                 </c:pt>
                 <c:pt idx="8">
-                  <c:v>SVM c10k</c:v>
+                  <c:v>SVM c1</c:v>
                 </c:pt>
                 <c:pt idx="9">
-                  <c:v>SVM c100k</c:v>
+                  <c:v>SVM c 0.1</c:v>
                 </c:pt>
                 <c:pt idx="10">
-                  <c:v>SVM c1000k</c:v>
+                  <c:v>SVM c 0.001</c:v>
                 </c:pt>
                 <c:pt idx="11">
                   <c:v>1-NN</c:v>
@@ -3875,13 +4155,13 @@
                   <c:v>0.95</c:v>
                 </c:pt>
                 <c:pt idx="8">
-                  <c:v>0</c:v>
+                  <c:v>0.88</c:v>
                 </c:pt>
                 <c:pt idx="9">
-                  <c:v>0</c:v>
+                  <c:v>0.88</c:v>
                 </c:pt>
                 <c:pt idx="10">
-                  <c:v>0</c:v>
+                  <c:v>0.88</c:v>
                 </c:pt>
                 <c:pt idx="11">
                   <c:v>0.88900000000000001</c:v>
@@ -3906,11 +4186,11 @@
         </c:dLbls>
         <c:gapWidth val="115"/>
         <c:overlap val="-20"/>
-        <c:axId val="1601048512"/>
-        <c:axId val="1601036000"/>
+        <c:axId val="1091086768"/>
+        <c:axId val="1091088400"/>
       </c:barChart>
       <c:catAx>
-        <c:axId val="1601048512"/>
+        <c:axId val="1091086768"/>
         <c:scaling>
           <c:orientation val="maxMin"/>
         </c:scaling>
@@ -3952,7 +4232,7 @@
             <a:endParaRPr lang="en-US"/>
           </a:p>
         </c:txPr>
-        <c:crossAx val="1601036000"/>
+        <c:crossAx val="1091088400"/>
         <c:crosses val="autoZero"/>
         <c:auto val="1"/>
         <c:lblAlgn val="ctr"/>
@@ -3960,7 +4240,7 @@
         <c:noMultiLvlLbl val="0"/>
       </c:catAx>
       <c:valAx>
-        <c:axId val="1601036000"/>
+        <c:axId val="1091088400"/>
         <c:scaling>
           <c:orientation val="minMax"/>
         </c:scaling>
@@ -4064,7 +4344,7 @@
             <a:endParaRPr lang="en-US"/>
           </a:p>
         </c:txPr>
-        <c:crossAx val="1601048512"/>
+        <c:crossAx val="1091086768"/>
         <c:crosses val="max"/>
         <c:crossBetween val="between"/>
       </c:valAx>
@@ -4329,13 +4609,13 @@
                   <c:v>Bagging</c:v>
                 </c:pt>
                 <c:pt idx="8">
-                  <c:v>SVM c10k</c:v>
+                  <c:v>SVM c1</c:v>
                 </c:pt>
                 <c:pt idx="9">
-                  <c:v>SVM c100k</c:v>
+                  <c:v>SVM c 0.1</c:v>
                 </c:pt>
                 <c:pt idx="10">
-                  <c:v>SVM c1000k</c:v>
+                  <c:v>SVM c 0.001</c:v>
                 </c:pt>
                 <c:pt idx="11">
                   <c:v>1-NN</c:v>
@@ -4380,13 +4660,13 @@
                   <c:v>0.876</c:v>
                 </c:pt>
                 <c:pt idx="8">
-                  <c:v>0</c:v>
+                  <c:v>0.87</c:v>
                 </c:pt>
                 <c:pt idx="9">
-                  <c:v>0</c:v>
+                  <c:v>0.86</c:v>
                 </c:pt>
                 <c:pt idx="10">
-                  <c:v>0</c:v>
+                  <c:v>0.85</c:v>
                 </c:pt>
                 <c:pt idx="11">
                   <c:v>0.83099999999999996</c:v>
@@ -4484,13 +4764,13 @@
                   <c:v>Bagging</c:v>
                 </c:pt>
                 <c:pt idx="8">
-                  <c:v>SVM c10k</c:v>
+                  <c:v>SVM c1</c:v>
                 </c:pt>
                 <c:pt idx="9">
-                  <c:v>SVM c100k</c:v>
+                  <c:v>SVM c 0.1</c:v>
                 </c:pt>
                 <c:pt idx="10">
-                  <c:v>SVM c1000k</c:v>
+                  <c:v>SVM c 0.001</c:v>
                 </c:pt>
                 <c:pt idx="11">
                   <c:v>1-NN</c:v>
@@ -4535,13 +4815,13 @@
                   <c:v>0.95</c:v>
                 </c:pt>
                 <c:pt idx="8">
-                  <c:v>0</c:v>
+                  <c:v>0.86</c:v>
                 </c:pt>
                 <c:pt idx="9">
-                  <c:v>0</c:v>
+                  <c:v>0.86</c:v>
                 </c:pt>
                 <c:pt idx="10">
-                  <c:v>0</c:v>
+                  <c:v>0.86</c:v>
                 </c:pt>
                 <c:pt idx="11">
                   <c:v>0.90300000000000002</c:v>
@@ -4566,11 +4846,11 @@
         </c:dLbls>
         <c:gapWidth val="115"/>
         <c:overlap val="-20"/>
-        <c:axId val="1601034368"/>
-        <c:axId val="1601044704"/>
+        <c:axId val="1091086224"/>
+        <c:axId val="1091085136"/>
       </c:barChart>
       <c:catAx>
-        <c:axId val="1601034368"/>
+        <c:axId val="1091086224"/>
         <c:scaling>
           <c:orientation val="maxMin"/>
         </c:scaling>
@@ -4612,7 +4892,7 @@
             <a:endParaRPr lang="en-US"/>
           </a:p>
         </c:txPr>
-        <c:crossAx val="1601044704"/>
+        <c:crossAx val="1091085136"/>
         <c:crosses val="autoZero"/>
         <c:auto val="1"/>
         <c:lblAlgn val="ctr"/>
@@ -4620,7 +4900,7 @@
         <c:noMultiLvlLbl val="0"/>
       </c:catAx>
       <c:valAx>
-        <c:axId val="1601044704"/>
+        <c:axId val="1091085136"/>
         <c:scaling>
           <c:orientation val="minMax"/>
         </c:scaling>
@@ -4724,7 +5004,7 @@
             <a:endParaRPr lang="en-US"/>
           </a:p>
         </c:txPr>
-        <c:crossAx val="1601034368"/>
+        <c:crossAx val="1091086224"/>
         <c:crosses val="max"/>
         <c:crossBetween val="between"/>
       </c:valAx>
@@ -4989,13 +5269,13 @@
                   <c:v>Bagging</c:v>
                 </c:pt>
                 <c:pt idx="8">
-                  <c:v>SVM c10k</c:v>
+                  <c:v>SVM c1</c:v>
                 </c:pt>
                 <c:pt idx="9">
-                  <c:v>SVM c100k</c:v>
+                  <c:v>SVM c 0.1</c:v>
                 </c:pt>
                 <c:pt idx="10">
-                  <c:v>SVM c1000k</c:v>
+                  <c:v>SVM c 0.001</c:v>
                 </c:pt>
                 <c:pt idx="11">
                   <c:v>1-NN</c:v>
@@ -5040,13 +5320,13 @@
                   <c:v>0.70799999999999996</c:v>
                 </c:pt>
                 <c:pt idx="8">
-                  <c:v>0</c:v>
+                  <c:v>0.6</c:v>
                 </c:pt>
                 <c:pt idx="9">
-                  <c:v>0</c:v>
+                  <c:v>0.6</c:v>
                 </c:pt>
                 <c:pt idx="10">
-                  <c:v>0</c:v>
+                  <c:v>0.57999999999999996</c:v>
                 </c:pt>
                 <c:pt idx="11">
                   <c:v>0.58899999999999997</c:v>
@@ -5144,13 +5424,13 @@
                   <c:v>Bagging</c:v>
                 </c:pt>
                 <c:pt idx="8">
-                  <c:v>SVM c10k</c:v>
+                  <c:v>SVM c1</c:v>
                 </c:pt>
                 <c:pt idx="9">
-                  <c:v>SVM c100k</c:v>
+                  <c:v>SVM c 0.1</c:v>
                 </c:pt>
                 <c:pt idx="10">
-                  <c:v>SVM c1000k</c:v>
+                  <c:v>SVM c 0.001</c:v>
                 </c:pt>
                 <c:pt idx="11">
                   <c:v>1-NN</c:v>
@@ -5195,13 +5475,13 @@
                   <c:v>0.98699999999999999</c:v>
                 </c:pt>
                 <c:pt idx="8">
-                  <c:v>0</c:v>
+                  <c:v>0.6</c:v>
                 </c:pt>
                 <c:pt idx="9">
-                  <c:v>0</c:v>
+                  <c:v>0.6</c:v>
                 </c:pt>
                 <c:pt idx="10">
-                  <c:v>0</c:v>
+                  <c:v>0.59</c:v>
                 </c:pt>
                 <c:pt idx="11">
                   <c:v>0.91100000000000003</c:v>
@@ -5226,11 +5506,11 @@
         </c:dLbls>
         <c:gapWidth val="115"/>
         <c:overlap val="-20"/>
-        <c:axId val="1601034912"/>
-        <c:axId val="1601042528"/>
+        <c:axId val="1091087856"/>
+        <c:axId val="1091090032"/>
       </c:barChart>
       <c:catAx>
-        <c:axId val="1601034912"/>
+        <c:axId val="1091087856"/>
         <c:scaling>
           <c:orientation val="maxMin"/>
         </c:scaling>
@@ -5272,7 +5552,7 @@
             <a:endParaRPr lang="en-US"/>
           </a:p>
         </c:txPr>
-        <c:crossAx val="1601042528"/>
+        <c:crossAx val="1091090032"/>
         <c:crosses val="autoZero"/>
         <c:auto val="1"/>
         <c:lblAlgn val="ctr"/>
@@ -5280,7 +5560,7 @@
         <c:noMultiLvlLbl val="0"/>
       </c:catAx>
       <c:valAx>
-        <c:axId val="1601042528"/>
+        <c:axId val="1091090032"/>
         <c:scaling>
           <c:orientation val="minMax"/>
         </c:scaling>
@@ -5384,7 +5664,7 @@
             <a:endParaRPr lang="en-US"/>
           </a:p>
         </c:txPr>
-        <c:crossAx val="1601034912"/>
+        <c:crossAx val="1091087856"/>
         <c:crosses val="max"/>
         <c:crossBetween val="between"/>
       </c:valAx>
@@ -5540,6 +5820,7 @@
           </a:p>
         </c:rich>
       </c:tx>
+      <c:layout/>
       <c:overlay val="0"/>
       <c:spPr>
         <a:noFill/>
@@ -5854,11 +6135,11 @@
         </c:dLbls>
         <c:gapWidth val="115"/>
         <c:overlap val="-30"/>
-        <c:axId val="1601040896"/>
-        <c:axId val="1601045248"/>
+        <c:axId val="1091091120"/>
+        <c:axId val="1091093296"/>
       </c:barChart>
       <c:catAx>
-        <c:axId val="1601040896"/>
+        <c:axId val="1091091120"/>
         <c:scaling>
           <c:orientation val="minMax"/>
         </c:scaling>
@@ -5900,7 +6181,7 @@
             <a:endParaRPr lang="en-US"/>
           </a:p>
         </c:txPr>
-        <c:crossAx val="1601045248"/>
+        <c:crossAx val="1091093296"/>
         <c:crosses val="autoZero"/>
         <c:auto val="1"/>
         <c:lblAlgn val="ctr"/>
@@ -5908,7 +6189,7 @@
         <c:noMultiLvlLbl val="0"/>
       </c:catAx>
       <c:valAx>
-        <c:axId val="1601045248"/>
+        <c:axId val="1091093296"/>
         <c:scaling>
           <c:orientation val="minMax"/>
         </c:scaling>
@@ -5953,6 +6234,7 @@
               </a:p>
             </c:rich>
           </c:tx>
+          <c:layout/>
           <c:overlay val="0"/>
           <c:spPr>
             <a:noFill/>
@@ -6011,7 +6293,7 @@
             <a:endParaRPr lang="en-US"/>
           </a:p>
         </c:txPr>
-        <c:crossAx val="1601040896"/>
+        <c:crossAx val="1091091120"/>
         <c:crosses val="autoZero"/>
         <c:crossBetween val="between"/>
       </c:valAx>
@@ -6025,6 +6307,7 @@
     </c:plotArea>
     <c:legend>
       <c:legendPos val="t"/>
+      <c:layout/>
       <c:overlay val="0"/>
       <c:spPr>
         <a:noFill/>
@@ -6166,6 +6449,7 @@
           </a:p>
         </c:rich>
       </c:tx>
+      <c:layout/>
       <c:overlay val="0"/>
       <c:spPr>
         <a:noFill/>
@@ -6480,11 +6764,11 @@
         </c:dLbls>
         <c:gapWidth val="115"/>
         <c:overlap val="-30"/>
-        <c:axId val="1601038176"/>
-        <c:axId val="1601041440"/>
+        <c:axId val="1091092208"/>
+        <c:axId val="1091092752"/>
       </c:barChart>
       <c:catAx>
-        <c:axId val="1601038176"/>
+        <c:axId val="1091092208"/>
         <c:scaling>
           <c:orientation val="minMax"/>
         </c:scaling>
@@ -6526,7 +6810,7 @@
             <a:endParaRPr lang="en-US"/>
           </a:p>
         </c:txPr>
-        <c:crossAx val="1601041440"/>
+        <c:crossAx val="1091092752"/>
         <c:crosses val="autoZero"/>
         <c:auto val="1"/>
         <c:lblAlgn val="ctr"/>
@@ -6534,7 +6818,7 @@
         <c:noMultiLvlLbl val="0"/>
       </c:catAx>
       <c:valAx>
-        <c:axId val="1601041440"/>
+        <c:axId val="1091092752"/>
         <c:scaling>
           <c:orientation val="minMax"/>
         </c:scaling>
@@ -6579,6 +6863,7 @@
               </a:p>
             </c:rich>
           </c:tx>
+          <c:layout/>
           <c:overlay val="0"/>
           <c:spPr>
             <a:noFill/>
@@ -6637,7 +6922,7 @@
             <a:endParaRPr lang="en-US"/>
           </a:p>
         </c:txPr>
-        <c:crossAx val="1601038176"/>
+        <c:crossAx val="1091092208"/>
         <c:crosses val="autoZero"/>
         <c:crossBetween val="between"/>
       </c:valAx>
@@ -6651,6 +6936,7 @@
     </c:plotArea>
     <c:legend>
       <c:legendPos val="t"/>
+      <c:layout/>
       <c:overlay val="0"/>
       <c:spPr>
         <a:noFill/>
@@ -15096,7 +15382,7 @@
           <p:nvPr>
             <p:extLst>
               <p:ext uri="{D42A27DB-BD31-4B8C-83A1-F6EECF244321}">
-                <p14:modId xmlns:p14="http://schemas.microsoft.com/office/powerpoint/2010/main" val="1858567224"/>
+                <p14:modId xmlns:p14="http://schemas.microsoft.com/office/powerpoint/2010/main" val="3868178186"/>
               </p:ext>
             </p:extLst>
           </p:nvPr>
@@ -15120,7 +15406,7 @@
           <p:nvPr>
             <p:extLst>
               <p:ext uri="{D42A27DB-BD31-4B8C-83A1-F6EECF244321}">
-                <p14:modId xmlns:p14="http://schemas.microsoft.com/office/powerpoint/2010/main" val="158066930"/>
+                <p14:modId xmlns:p14="http://schemas.microsoft.com/office/powerpoint/2010/main" val="4068183961"/>
               </p:ext>
             </p:extLst>
           </p:nvPr>
@@ -15144,7 +15430,7 @@
           <p:nvPr>
             <p:extLst>
               <p:ext uri="{D42A27DB-BD31-4B8C-83A1-F6EECF244321}">
-                <p14:modId xmlns:p14="http://schemas.microsoft.com/office/powerpoint/2010/main" val="778849788"/>
+                <p14:modId xmlns:p14="http://schemas.microsoft.com/office/powerpoint/2010/main" val="47715998"/>
               </p:ext>
             </p:extLst>
           </p:nvPr>
@@ -15236,7 +15522,7 @@
           <p:nvPr>
             <p:extLst>
               <p:ext uri="{D42A27DB-BD31-4B8C-83A1-F6EECF244321}">
-                <p14:modId xmlns:p14="http://schemas.microsoft.com/office/powerpoint/2010/main" val="1943601879"/>
+                <p14:modId xmlns:p14="http://schemas.microsoft.com/office/powerpoint/2010/main" val="264739362"/>
               </p:ext>
             </p:extLst>
           </p:nvPr>
@@ -15260,7 +15546,7 @@
           <p:nvPr>
             <p:extLst>
               <p:ext uri="{D42A27DB-BD31-4B8C-83A1-F6EECF244321}">
-                <p14:modId xmlns:p14="http://schemas.microsoft.com/office/powerpoint/2010/main" val="2186499089"/>
+                <p14:modId xmlns:p14="http://schemas.microsoft.com/office/powerpoint/2010/main" val="686738392"/>
               </p:ext>
             </p:extLst>
           </p:nvPr>
@@ -15284,7 +15570,7 @@
           <p:nvPr>
             <p:extLst>
               <p:ext uri="{D42A27DB-BD31-4B8C-83A1-F6EECF244321}">
-                <p14:modId xmlns:p14="http://schemas.microsoft.com/office/powerpoint/2010/main" val="3655263036"/>
+                <p14:modId xmlns:p14="http://schemas.microsoft.com/office/powerpoint/2010/main" val="180492399"/>
               </p:ext>
             </p:extLst>
           </p:nvPr>

</xml_diff>